<commit_message>
added guidance for Week 1 homework
</commit_message>
<xml_diff>
--- a/Week 2 -- mixed-effects/Lecture 2/Lecture 2 -- Mixed-effects models.pptx
+++ b/Week 2 -- mixed-effects/Lecture 2/Lecture 2 -- Mixed-effects models.pptx
@@ -5,7 +5,7 @@
     <p:sldMasterId id="2147483672" r:id="rId1"/>
   </p:sldMasterIdLst>
   <p:notesMasterIdLst>
-    <p:notesMasterId r:id="rId26"/>
+    <p:notesMasterId r:id="rId27"/>
   </p:notesMasterIdLst>
   <p:sldIdLst>
     <p:sldId id="266" r:id="rId2"/>
@@ -22,16 +22,17 @@
     <p:sldId id="304" r:id="rId13"/>
     <p:sldId id="318" r:id="rId14"/>
     <p:sldId id="312" r:id="rId15"/>
-    <p:sldId id="313" r:id="rId16"/>
-    <p:sldId id="305" r:id="rId17"/>
-    <p:sldId id="306" r:id="rId18"/>
-    <p:sldId id="309" r:id="rId19"/>
-    <p:sldId id="320" r:id="rId20"/>
-    <p:sldId id="323" r:id="rId21"/>
-    <p:sldId id="324" r:id="rId22"/>
-    <p:sldId id="322" r:id="rId23"/>
-    <p:sldId id="325" r:id="rId24"/>
-    <p:sldId id="326" r:id="rId25"/>
+    <p:sldId id="327" r:id="rId16"/>
+    <p:sldId id="313" r:id="rId17"/>
+    <p:sldId id="305" r:id="rId18"/>
+    <p:sldId id="306" r:id="rId19"/>
+    <p:sldId id="309" r:id="rId20"/>
+    <p:sldId id="320" r:id="rId21"/>
+    <p:sldId id="323" r:id="rId22"/>
+    <p:sldId id="324" r:id="rId23"/>
+    <p:sldId id="322" r:id="rId24"/>
+    <p:sldId id="325" r:id="rId25"/>
+    <p:sldId id="326" r:id="rId26"/>
   </p:sldIdLst>
   <p:sldSz cx="9144000" cy="6858000" type="screen4x3"/>
   <p:notesSz cx="6858000" cy="9144000"/>
@@ -220,7 +221,7 @@
           <a:p>
             <a:fld id="{1522831B-4FE3-4D45-950B-0D2C6BB2DD76}" type="datetimeFigureOut">
               <a:rPr lang="en-US" smtClean="0"/>
-              <a:t>4/4/2016</a:t>
+              <a:t>4/5/2016</a:t>
             </a:fld>
             <a:endParaRPr lang="en-US"/>
           </a:p>
@@ -5734,7 +5735,7 @@
             <p:spPr/>
             <p:txBody>
               <a:bodyPr>
-                <a:normAutofit fontScale="55000" lnSpcReduction="20000"/>
+                <a:normAutofit/>
               </a:bodyPr>
               <a:lstStyle/>
               <a:p>
@@ -6557,6 +6558,618 @@
                     </m:oMath>
                   </m:oMathPara>
                 </a14:m>
+                <a:endParaRPr lang="en-US" dirty="0" smtClean="0"/>
+              </a:p>
+              <a:p>
+                <a:pPr lvl="1"/>
+                <a:r>
+                  <a:rPr lang="en-US" dirty="0" smtClean="0"/>
+                  <a:t>Approximate joint likelihood via Taylor series expansion</a:t>
+                </a:r>
+              </a:p>
+              <a:p>
+                <a:pPr marL="0" indent="0">
+                  <a:buNone/>
+                </a:pPr>
+                <a14:m>
+                  <m:oMathPara xmlns:m="http://schemas.openxmlformats.org/officeDocument/2006/math">
+                    <m:oMathParaPr>
+                      <m:jc m:val="centerGroup"/>
+                    </m:oMathParaPr>
+                    <m:oMath xmlns:m="http://schemas.openxmlformats.org/officeDocument/2006/math">
+                      <m:func>
+                        <m:funcPr>
+                          <m:ctrlPr>
+                            <a:rPr lang="en-US" i="1">
+                              <a:latin typeface="Cambria Math" panose="02040503050406030204" pitchFamily="18" charset="0"/>
+                              <a:ea typeface="Cambria Math"/>
+                            </a:rPr>
+                          </m:ctrlPr>
+                        </m:funcPr>
+                        <m:fName>
+                          <m:r>
+                            <m:rPr>
+                              <m:sty m:val="p"/>
+                            </m:rPr>
+                            <a:rPr lang="en-US">
+                              <a:latin typeface="Cambria Math" panose="02040503050406030204" pitchFamily="18" charset="0"/>
+                            </a:rPr>
+                            <m:t>Pr</m:t>
+                          </m:r>
+                        </m:fName>
+                        <m:e>
+                          <m:d>
+                            <m:dPr>
+                              <m:ctrlPr>
+                                <a:rPr lang="en-US" i="1">
+                                  <a:latin typeface="Cambria Math" panose="02040503050406030204" pitchFamily="18" charset="0"/>
+                                </a:rPr>
+                              </m:ctrlPr>
+                            </m:dPr>
+                            <m:e>
+                              <m:r>
+                                <a:rPr lang="en-US" i="1">
+                                  <a:latin typeface="Cambria Math" panose="02040503050406030204" pitchFamily="18" charset="0"/>
+                                </a:rPr>
+                                <m:t>𝑦</m:t>
+                              </m:r>
+                            </m:e>
+                            <m:e>
+                              <m:sSub>
+                                <m:sSubPr>
+                                  <m:ctrlPr>
+                                    <a:rPr lang="en-US" i="1">
+                                      <a:latin typeface="Cambria Math" panose="02040503050406030204" pitchFamily="18" charset="0"/>
+                                      <a:ea typeface="Cambria Math"/>
+                                    </a:rPr>
+                                  </m:ctrlPr>
+                                </m:sSubPr>
+                                <m:e>
+                                  <m:r>
+                                    <a:rPr lang="en-US" i="1">
+                                      <a:latin typeface="Cambria Math"/>
+                                      <a:ea typeface="Cambria Math"/>
+                                    </a:rPr>
+                                    <m:t>𝜃</m:t>
+                                  </m:r>
+                                </m:e>
+                                <m:sub>
+                                  <m:r>
+                                    <a:rPr lang="en-US" i="1">
+                                      <a:latin typeface="Cambria Math" panose="02040503050406030204" pitchFamily="18" charset="0"/>
+                                      <a:ea typeface="Cambria Math"/>
+                                    </a:rPr>
+                                    <m:t>1</m:t>
+                                  </m:r>
+                                </m:sub>
+                              </m:sSub>
+                              <m:r>
+                                <a:rPr lang="en-US" i="1">
+                                  <a:latin typeface="Cambria Math" panose="02040503050406030204" pitchFamily="18" charset="0"/>
+                                  <a:ea typeface="Cambria Math"/>
+                                </a:rPr>
+                                <m:t>,</m:t>
+                              </m:r>
+                              <m:r>
+                                <a:rPr lang="en-US" i="1">
+                                  <a:latin typeface="Cambria Math"/>
+                                  <a:ea typeface="Cambria Math"/>
+                                </a:rPr>
+                                <m:t>𝜀</m:t>
+                              </m:r>
+                            </m:e>
+                          </m:d>
+                        </m:e>
+                      </m:func>
+                      <m:func>
+                        <m:funcPr>
+                          <m:ctrlPr>
+                            <a:rPr lang="en-US" i="1">
+                              <a:latin typeface="Cambria Math" panose="02040503050406030204" pitchFamily="18" charset="0"/>
+                              <a:ea typeface="Cambria Math"/>
+                            </a:rPr>
+                          </m:ctrlPr>
+                        </m:funcPr>
+                        <m:fName>
+                          <m:r>
+                            <m:rPr>
+                              <m:sty m:val="p"/>
+                            </m:rPr>
+                            <a:rPr lang="en-US">
+                              <a:latin typeface="Cambria Math" panose="02040503050406030204" pitchFamily="18" charset="0"/>
+                              <a:ea typeface="Cambria Math"/>
+                            </a:rPr>
+                            <m:t>Pr</m:t>
+                          </m:r>
+                        </m:fName>
+                        <m:e>
+                          <m:d>
+                            <m:dPr>
+                              <m:ctrlPr>
+                                <a:rPr lang="en-US" i="1">
+                                  <a:latin typeface="Cambria Math" panose="02040503050406030204" pitchFamily="18" charset="0"/>
+                                  <a:ea typeface="Cambria Math"/>
+                                </a:rPr>
+                              </m:ctrlPr>
+                            </m:dPr>
+                            <m:e>
+                              <m:r>
+                                <a:rPr lang="en-US" i="1">
+                                  <a:latin typeface="Cambria Math"/>
+                                  <a:ea typeface="Cambria Math"/>
+                                </a:rPr>
+                                <m:t>𝜀</m:t>
+                              </m:r>
+                              <m:r>
+                                <a:rPr lang="en-US" i="1">
+                                  <a:latin typeface="Cambria Math" panose="02040503050406030204" pitchFamily="18" charset="0"/>
+                                  <a:ea typeface="Cambria Math"/>
+                                </a:rPr>
+                                <m:t>|</m:t>
+                              </m:r>
+                              <m:sSub>
+                                <m:sSubPr>
+                                  <m:ctrlPr>
+                                    <a:rPr lang="en-US" i="1">
+                                      <a:latin typeface="Cambria Math" panose="02040503050406030204" pitchFamily="18" charset="0"/>
+                                      <a:ea typeface="Cambria Math"/>
+                                    </a:rPr>
+                                  </m:ctrlPr>
+                                </m:sSubPr>
+                                <m:e>
+                                  <m:r>
+                                    <a:rPr lang="en-US" i="1">
+                                      <a:latin typeface="Cambria Math"/>
+                                      <a:ea typeface="Cambria Math"/>
+                                    </a:rPr>
+                                    <m:t>𝜃</m:t>
+                                  </m:r>
+                                </m:e>
+                                <m:sub>
+                                  <m:r>
+                                    <a:rPr lang="en-US" i="1">
+                                      <a:latin typeface="Cambria Math" panose="02040503050406030204" pitchFamily="18" charset="0"/>
+                                      <a:ea typeface="Cambria Math"/>
+                                    </a:rPr>
+                                    <m:t>2</m:t>
+                                  </m:r>
+                                </m:sub>
+                              </m:sSub>
+                            </m:e>
+                          </m:d>
+                        </m:e>
+                      </m:func>
+                      <m:r>
+                        <a:rPr lang="en-US" b="0" i="1" smtClean="0">
+                          <a:latin typeface="Cambria Math" panose="02040503050406030204" pitchFamily="18" charset="0"/>
+                        </a:rPr>
+                        <m:t>=</m:t>
+                      </m:r>
+                      <m:sSup>
+                        <m:sSupPr>
+                          <m:ctrlPr>
+                            <a:rPr lang="en-US" i="1" smtClean="0">
+                              <a:latin typeface="Cambria Math" panose="02040503050406030204" pitchFamily="18" charset="0"/>
+                            </a:rPr>
+                          </m:ctrlPr>
+                        </m:sSupPr>
+                        <m:e>
+                          <m:r>
+                            <a:rPr lang="en-US" b="0" i="1" smtClean="0">
+                              <a:latin typeface="Cambria Math"/>
+                            </a:rPr>
+                            <m:t>𝑒</m:t>
+                          </m:r>
+                        </m:e>
+                        <m:sup>
+                          <m:r>
+                            <a:rPr lang="en-US" b="0" i="1" smtClean="0">
+                              <a:latin typeface="Cambria Math"/>
+                            </a:rPr>
+                            <m:t>𝑓</m:t>
+                          </m:r>
+                          <m:r>
+                            <a:rPr lang="en-US" b="0" i="1" smtClean="0">
+                              <a:latin typeface="Cambria Math"/>
+                            </a:rPr>
+                            <m:t>(</m:t>
+                          </m:r>
+                          <m:r>
+                            <a:rPr lang="en-US" i="1">
+                              <a:latin typeface="Cambria Math" panose="02040503050406030204" pitchFamily="18" charset="0"/>
+                              <a:ea typeface="Cambria Math" panose="02040503050406030204" pitchFamily="18" charset="0"/>
+                            </a:rPr>
+                            <m:t>𝜀</m:t>
+                          </m:r>
+                          <m:r>
+                            <a:rPr lang="en-US" i="1">
+                              <a:latin typeface="Cambria Math" panose="02040503050406030204" pitchFamily="18" charset="0"/>
+                              <a:ea typeface="Cambria Math" panose="02040503050406030204" pitchFamily="18" charset="0"/>
+                            </a:rPr>
+                            <m:t>|</m:t>
+                          </m:r>
+                          <m:r>
+                            <a:rPr lang="en-US" i="1">
+                              <a:latin typeface="Cambria Math" panose="02040503050406030204" pitchFamily="18" charset="0"/>
+                              <a:ea typeface="Cambria Math" panose="02040503050406030204" pitchFamily="18" charset="0"/>
+                            </a:rPr>
+                            <m:t>𝜃</m:t>
+                          </m:r>
+                          <m:r>
+                            <a:rPr lang="en-US" b="0" i="1" smtClean="0">
+                              <a:latin typeface="Cambria Math"/>
+                            </a:rPr>
+                            <m:t>)</m:t>
+                          </m:r>
+                        </m:sup>
+                      </m:sSup>
+                      <m:r>
+                        <a:rPr lang="en-US" i="1" smtClean="0">
+                          <a:latin typeface="Cambria Math"/>
+                          <a:ea typeface="Cambria Math"/>
+                        </a:rPr>
+                        <m:t>≈</m:t>
+                      </m:r>
+                      <m:sSup>
+                        <m:sSupPr>
+                          <m:ctrlPr>
+                            <a:rPr lang="en-US" i="1" smtClean="0">
+                              <a:latin typeface="Cambria Math" panose="02040503050406030204" pitchFamily="18" charset="0"/>
+                              <a:ea typeface="Cambria Math"/>
+                            </a:rPr>
+                          </m:ctrlPr>
+                        </m:sSupPr>
+                        <m:e>
+                          <m:r>
+                            <a:rPr lang="en-US" b="0" i="1" smtClean="0">
+                              <a:latin typeface="Cambria Math"/>
+                              <a:ea typeface="Cambria Math"/>
+                            </a:rPr>
+                            <m:t>𝑒</m:t>
+                          </m:r>
+                        </m:e>
+                        <m:sup>
+                          <m:r>
+                            <a:rPr lang="en-US" b="0" i="1" smtClean="0">
+                              <a:latin typeface="Cambria Math"/>
+                              <a:ea typeface="Cambria Math"/>
+                            </a:rPr>
+                            <m:t>𝑓</m:t>
+                          </m:r>
+                          <m:d>
+                            <m:dPr>
+                              <m:ctrlPr>
+                                <a:rPr lang="en-US" b="0" i="1" smtClean="0">
+                                  <a:latin typeface="Cambria Math" panose="02040503050406030204" pitchFamily="18" charset="0"/>
+                                  <a:ea typeface="Cambria Math"/>
+                                </a:rPr>
+                              </m:ctrlPr>
+                            </m:dPr>
+                            <m:e>
+                              <m:acc>
+                                <m:accPr>
+                                  <m:chr m:val="̂"/>
+                                  <m:ctrlPr>
+                                    <a:rPr lang="en-US" i="1">
+                                      <a:latin typeface="Cambria Math" panose="02040503050406030204" pitchFamily="18" charset="0"/>
+                                      <a:ea typeface="Cambria Math"/>
+                                    </a:rPr>
+                                  </m:ctrlPr>
+                                </m:accPr>
+                                <m:e>
+                                  <m:r>
+                                    <a:rPr lang="en-US" i="1">
+                                      <a:latin typeface="Cambria Math" panose="02040503050406030204" pitchFamily="18" charset="0"/>
+                                      <a:ea typeface="Cambria Math" panose="02040503050406030204" pitchFamily="18" charset="0"/>
+                                    </a:rPr>
+                                    <m:t>𝜀</m:t>
+                                  </m:r>
+                                </m:e>
+                              </m:acc>
+                              <m:r>
+                                <a:rPr lang="en-US" i="1">
+                                  <a:latin typeface="Cambria Math" panose="02040503050406030204" pitchFamily="18" charset="0"/>
+                                  <a:ea typeface="Cambria Math" panose="02040503050406030204" pitchFamily="18" charset="0"/>
+                                </a:rPr>
+                                <m:t>|</m:t>
+                              </m:r>
+                              <m:r>
+                                <a:rPr lang="en-US" i="1">
+                                  <a:latin typeface="Cambria Math" panose="02040503050406030204" pitchFamily="18" charset="0"/>
+                                  <a:ea typeface="Cambria Math" panose="02040503050406030204" pitchFamily="18" charset="0"/>
+                                </a:rPr>
+                                <m:t>𝜃</m:t>
+                              </m:r>
+                            </m:e>
+                          </m:d>
+                          <m:r>
+                            <a:rPr lang="en-US" b="0" i="1" smtClean="0">
+                              <a:latin typeface="Cambria Math"/>
+                              <a:ea typeface="Cambria Math"/>
+                            </a:rPr>
+                            <m:t>−</m:t>
+                          </m:r>
+                          <m:f>
+                            <m:fPr>
+                              <m:ctrlPr>
+                                <a:rPr lang="en-US" b="0" i="1" smtClean="0">
+                                  <a:latin typeface="Cambria Math" panose="02040503050406030204" pitchFamily="18" charset="0"/>
+                                  <a:ea typeface="Cambria Math"/>
+                                </a:rPr>
+                              </m:ctrlPr>
+                            </m:fPr>
+                            <m:num>
+                              <m:r>
+                                <a:rPr lang="en-US" b="0" i="1" smtClean="0">
+                                  <a:latin typeface="Cambria Math"/>
+                                  <a:ea typeface="Cambria Math"/>
+                                </a:rPr>
+                                <m:t>1</m:t>
+                              </m:r>
+                            </m:num>
+                            <m:den>
+                              <m:r>
+                                <a:rPr lang="en-US" b="0" i="1" smtClean="0">
+                                  <a:latin typeface="Cambria Math"/>
+                                  <a:ea typeface="Cambria Math"/>
+                                </a:rPr>
+                                <m:t>2</m:t>
+                              </m:r>
+                            </m:den>
+                          </m:f>
+                          <m:d>
+                            <m:dPr>
+                              <m:begChr m:val="|"/>
+                              <m:endChr m:val="|"/>
+                              <m:ctrlPr>
+                                <a:rPr lang="en-US" b="0" i="1" smtClean="0">
+                                  <a:latin typeface="Cambria Math" panose="02040503050406030204" pitchFamily="18" charset="0"/>
+                                  <a:ea typeface="Cambria Math"/>
+                                </a:rPr>
+                              </m:ctrlPr>
+                            </m:dPr>
+                            <m:e>
+                              <m:r>
+                                <a:rPr lang="en-US" b="0" i="1" smtClean="0">
+                                  <a:latin typeface="Cambria Math"/>
+                                  <a:ea typeface="Cambria Math"/>
+                                </a:rPr>
+                                <m:t>𝑓</m:t>
+                              </m:r>
+                              <m:r>
+                                <a:rPr lang="en-US" b="0" i="1" smtClean="0">
+                                  <a:latin typeface="Cambria Math"/>
+                                  <a:ea typeface="Cambria Math"/>
+                                </a:rPr>
+                                <m:t>′′(</m:t>
+                              </m:r>
+                              <m:acc>
+                                <m:accPr>
+                                  <m:chr m:val="̂"/>
+                                  <m:ctrlPr>
+                                    <a:rPr lang="en-US" i="1">
+                                      <a:latin typeface="Cambria Math" panose="02040503050406030204" pitchFamily="18" charset="0"/>
+                                      <a:ea typeface="Cambria Math"/>
+                                    </a:rPr>
+                                  </m:ctrlPr>
+                                </m:accPr>
+                                <m:e>
+                                  <m:r>
+                                    <a:rPr lang="en-US" i="1">
+                                      <a:latin typeface="Cambria Math" panose="02040503050406030204" pitchFamily="18" charset="0"/>
+                                      <a:ea typeface="Cambria Math" panose="02040503050406030204" pitchFamily="18" charset="0"/>
+                                    </a:rPr>
+                                    <m:t>𝜀</m:t>
+                                  </m:r>
+                                </m:e>
+                              </m:acc>
+                              <m:r>
+                                <a:rPr lang="en-US" b="0" i="1" smtClean="0">
+                                  <a:latin typeface="Cambria Math"/>
+                                  <a:ea typeface="Cambria Math"/>
+                                </a:rPr>
+                                <m:t>)</m:t>
+                              </m:r>
+                            </m:e>
+                          </m:d>
+                          <m:sSup>
+                            <m:sSupPr>
+                              <m:ctrlPr>
+                                <a:rPr lang="en-US" b="0" i="1" smtClean="0">
+                                  <a:latin typeface="Cambria Math" panose="02040503050406030204" pitchFamily="18" charset="0"/>
+                                  <a:ea typeface="Cambria Math"/>
+                                </a:rPr>
+                              </m:ctrlPr>
+                            </m:sSupPr>
+                            <m:e>
+                              <m:r>
+                                <a:rPr lang="en-US" b="0" i="1" smtClean="0">
+                                  <a:latin typeface="Cambria Math"/>
+                                  <a:ea typeface="Cambria Math"/>
+                                </a:rPr>
+                                <m:t>(</m:t>
+                              </m:r>
+                              <m:acc>
+                                <m:accPr>
+                                  <m:chr m:val="̂"/>
+                                  <m:ctrlPr>
+                                    <a:rPr lang="en-US" i="1">
+                                      <a:latin typeface="Cambria Math" panose="02040503050406030204" pitchFamily="18" charset="0"/>
+                                      <a:ea typeface="Cambria Math"/>
+                                    </a:rPr>
+                                  </m:ctrlPr>
+                                </m:accPr>
+                                <m:e>
+                                  <m:r>
+                                    <a:rPr lang="en-US" i="1">
+                                      <a:latin typeface="Cambria Math" panose="02040503050406030204" pitchFamily="18" charset="0"/>
+                                      <a:ea typeface="Cambria Math" panose="02040503050406030204" pitchFamily="18" charset="0"/>
+                                    </a:rPr>
+                                    <m:t>𝜀</m:t>
+                                  </m:r>
+                                </m:e>
+                              </m:acc>
+                              <m:r>
+                                <a:rPr lang="en-US" b="0" i="1" smtClean="0">
+                                  <a:latin typeface="Cambria Math"/>
+                                  <a:ea typeface="Cambria Math"/>
+                                </a:rPr>
+                                <m:t>−</m:t>
+                              </m:r>
+                              <m:r>
+                                <a:rPr lang="en-US" i="1">
+                                  <a:latin typeface="Cambria Math" panose="02040503050406030204" pitchFamily="18" charset="0"/>
+                                  <a:ea typeface="Cambria Math" panose="02040503050406030204" pitchFamily="18" charset="0"/>
+                                </a:rPr>
+                                <m:t>𝜀</m:t>
+                              </m:r>
+                              <m:r>
+                                <a:rPr lang="en-US" b="0" i="1" smtClean="0">
+                                  <a:latin typeface="Cambria Math"/>
+                                  <a:ea typeface="Cambria Math"/>
+                                </a:rPr>
+                                <m:t>)</m:t>
+                              </m:r>
+                            </m:e>
+                            <m:sup>
+                              <m:r>
+                                <a:rPr lang="en-US" b="0" i="1" smtClean="0">
+                                  <a:latin typeface="Cambria Math"/>
+                                  <a:ea typeface="Cambria Math"/>
+                                </a:rPr>
+                                <m:t>2</m:t>
+                              </m:r>
+                            </m:sup>
+                          </m:sSup>
+                        </m:sup>
+                      </m:sSup>
+                    </m:oMath>
+                  </m:oMathPara>
+                </a14:m>
+                <a:endParaRPr lang="en-US" dirty="0" smtClean="0"/>
+              </a:p>
+            </p:txBody>
+          </p:sp>
+        </mc:Choice>
+        <mc:Fallback>
+          <p:sp>
+            <p:nvSpPr>
+              <p:cNvPr id="3" name="Content Placeholder 2"/>
+              <p:cNvSpPr>
+                <a:spLocks noGrp="1" noRot="1" noChangeAspect="1" noMove="1" noResize="1" noEditPoints="1" noAdjustHandles="1" noChangeArrowheads="1" noChangeShapeType="1" noTextEdit="1"/>
+              </p:cNvSpPr>
+              <p:nvPr>
+                <p:ph idx="1"/>
+              </p:nvPr>
+            </p:nvSpPr>
+            <p:spPr>
+              <a:blipFill>
+                <a:blip r:embed="rId2"/>
+                <a:stretch>
+                  <a:fillRect l="-1424" t="-1026"/>
+                </a:stretch>
+              </a:blipFill>
+            </p:spPr>
+            <p:txBody>
+              <a:bodyPr/>
+              <a:lstStyle/>
+              <a:p>
+                <a:r>
+                  <a:rPr lang="en-GB">
+                    <a:noFill/>
+                  </a:rPr>
+                  <a:t> </a:t>
+                </a:r>
+              </a:p>
+            </p:txBody>
+          </p:sp>
+        </mc:Fallback>
+      </mc:AlternateContent>
+    </p:spTree>
+    <p:extLst>
+      <p:ext uri="{BB962C8B-B14F-4D97-AF65-F5344CB8AC3E}">
+        <p14:creationId xmlns:p14="http://schemas.microsoft.com/office/powerpoint/2010/main" val="3720437709"/>
+      </p:ext>
+    </p:extLst>
+  </p:cSld>
+  <p:clrMapOvr>
+    <a:masterClrMapping/>
+  </p:clrMapOvr>
+  <p:timing>
+    <p:tnLst>
+      <p:par>
+        <p:cTn id="1" dur="indefinite" restart="never" nodeType="tmRoot"/>
+      </p:par>
+    </p:tnLst>
+  </p:timing>
+</p:sld>
+</file>
+
+<file path=ppt/slides/slide15.xml><?xml version="1.0" encoding="utf-8"?>
+<p:sld xmlns:a="http://schemas.openxmlformats.org/drawingml/2006/main" xmlns:r="http://schemas.openxmlformats.org/officeDocument/2006/relationships" xmlns:p="http://schemas.openxmlformats.org/presentationml/2006/main">
+  <p:cSld>
+    <p:spTree>
+      <p:nvGrpSpPr>
+        <p:cNvPr id="1" name=""/>
+        <p:cNvGrpSpPr/>
+        <p:nvPr/>
+      </p:nvGrpSpPr>
+      <p:grpSpPr>
+        <a:xfrm>
+          <a:off x="0" y="0"/>
+          <a:ext cx="0" cy="0"/>
+          <a:chOff x="0" y="0"/>
+          <a:chExt cx="0" cy="0"/>
+        </a:xfrm>
+      </p:grpSpPr>
+      <p:sp>
+        <p:nvSpPr>
+          <p:cNvPr id="2" name="Title 1"/>
+          <p:cNvSpPr>
+            <a:spLocks noGrp="1"/>
+          </p:cNvSpPr>
+          <p:nvPr>
+            <p:ph type="title"/>
+          </p:nvPr>
+        </p:nvSpPr>
+        <p:spPr/>
+        <p:txBody>
+          <a:bodyPr/>
+          <a:lstStyle/>
+          <a:p>
+            <a:r>
+              <a:rPr lang="en-US" dirty="0"/>
+              <a:t>Likelihood statistics</a:t>
+            </a:r>
+          </a:p>
+        </p:txBody>
+      </p:sp>
+      <mc:AlternateContent xmlns:mc="http://schemas.openxmlformats.org/markup-compatibility/2006">
+        <mc:Choice xmlns:a14="http://schemas.microsoft.com/office/drawing/2010/main" Requires="a14">
+          <p:sp>
+            <p:nvSpPr>
+              <p:cNvPr id="3" name="Content Placeholder 2"/>
+              <p:cNvSpPr>
+                <a:spLocks noGrp="1"/>
+              </p:cNvSpPr>
+              <p:nvPr>
+                <p:ph idx="1"/>
+              </p:nvPr>
+            </p:nvSpPr>
+            <p:spPr/>
+            <p:txBody>
+              <a:bodyPr>
+                <a:normAutofit fontScale="85000" lnSpcReduction="10000"/>
+              </a:bodyPr>
+              <a:lstStyle/>
+              <a:p>
+                <a:pPr marL="0" indent="0">
+                  <a:buNone/>
+                </a:pPr>
+                <a:r>
+                  <a:rPr lang="en-US" b="1" dirty="0" smtClean="0"/>
+                  <a:t>Laplace approximation</a:t>
+                </a:r>
                 <a:endParaRPr lang="en-US" dirty="0" smtClean="0"/>
               </a:p>
               <a:p>
@@ -7908,8 +8521,13 @@
                 </a14:m>
                 <a:r>
                   <a:rPr lang="en-US" dirty="0" smtClean="0"/>
-                  <a:t> is the mean of the normal distribution</a:t>
+                  <a:t> is the mean of the normal </a:t>
                 </a:r>
+                <a:r>
+                  <a:rPr lang="en-US" dirty="0" smtClean="0"/>
+                  <a:t>distribution </a:t>
+                </a:r>
+                <a:endParaRPr lang="en-US" dirty="0" smtClean="0"/>
               </a:p>
               <a:p>
                 <a:pPr lvl="2"/>
@@ -7960,8 +8578,539 @@
                 </a14:m>
                 <a:r>
                   <a:rPr lang="en-US" dirty="0" smtClean="0"/>
-                  <a:t> is the covariance of the normal distribution</a:t>
+                  <a:t> is the </a:t>
                 </a:r>
+                <a:r>
+                  <a:rPr lang="en-US" dirty="0" smtClean="0"/>
+                  <a:t>hessian </a:t>
+                </a:r>
+                <a:r>
+                  <a:rPr lang="en-US" dirty="0" smtClean="0"/>
+                  <a:t>of the normal </a:t>
+                </a:r>
+                <a:r>
+                  <a:rPr lang="en-US" dirty="0" smtClean="0"/>
+                  <a:t>distribution (</a:t>
+                </a:r>
+                <a14:m>
+                  <m:oMath xmlns:m="http://schemas.openxmlformats.org/officeDocument/2006/math">
+                    <m:sSup>
+                      <m:sSupPr>
+                        <m:ctrlPr>
+                          <a:rPr lang="en-US" i="1">
+                            <a:latin typeface="Cambria Math"/>
+                            <a:ea typeface="Cambria Math"/>
+                          </a:rPr>
+                        </m:ctrlPr>
+                      </m:sSupPr>
+                      <m:e>
+                        <m:r>
+                          <a:rPr lang="en-US" i="1">
+                            <a:latin typeface="Cambria Math"/>
+                            <a:ea typeface="Cambria Math"/>
+                          </a:rPr>
+                          <m:t>𝑓</m:t>
+                        </m:r>
+                      </m:e>
+                      <m:sup>
+                        <m:r>
+                          <a:rPr lang="en-US" i="1">
+                            <a:latin typeface="Cambria Math"/>
+                            <a:ea typeface="Cambria Math"/>
+                          </a:rPr>
+                          <m:t>′′</m:t>
+                        </m:r>
+                      </m:sup>
+                    </m:sSup>
+                    <m:d>
+                      <m:dPr>
+                        <m:ctrlPr>
+                          <a:rPr lang="en-US" i="1">
+                            <a:latin typeface="Cambria Math"/>
+                            <a:ea typeface="Cambria Math"/>
+                          </a:rPr>
+                        </m:ctrlPr>
+                      </m:dPr>
+                      <m:e>
+                        <m:acc>
+                          <m:accPr>
+                            <m:chr m:val="̂"/>
+                            <m:ctrlPr>
+                              <a:rPr lang="en-US" i="1">
+                                <a:latin typeface="Cambria Math" panose="02040503050406030204" pitchFamily="18" charset="0"/>
+                                <a:ea typeface="Cambria Math"/>
+                              </a:rPr>
+                            </m:ctrlPr>
+                          </m:accPr>
+                          <m:e>
+                            <m:r>
+                              <a:rPr lang="en-US" i="1">
+                                <a:latin typeface="Cambria Math" panose="02040503050406030204" pitchFamily="18" charset="0"/>
+                                <a:ea typeface="Cambria Math" panose="02040503050406030204" pitchFamily="18" charset="0"/>
+                              </a:rPr>
+                              <m:t>𝜀</m:t>
+                            </m:r>
+                          </m:e>
+                        </m:acc>
+                      </m:e>
+                    </m:d>
+                    <m:r>
+                      <a:rPr lang="en-US" b="0" i="1" smtClean="0">
+                        <a:latin typeface="Cambria Math" panose="02040503050406030204" pitchFamily="18" charset="0"/>
+                        <a:ea typeface="Cambria Math"/>
+                      </a:rPr>
+                      <m:t>=</m:t>
+                    </m:r>
+                    <m:sSup>
+                      <m:sSupPr>
+                        <m:ctrlPr>
+                          <a:rPr lang="en-US" i="1">
+                            <a:latin typeface="Cambria Math" panose="02040503050406030204" pitchFamily="18" charset="0"/>
+                            <a:ea typeface="Cambria Math" panose="02040503050406030204" pitchFamily="18" charset="0"/>
+                          </a:rPr>
+                        </m:ctrlPr>
+                      </m:sSupPr>
+                      <m:e>
+                        <m:r>
+                          <m:rPr>
+                            <m:sty m:val="p"/>
+                          </m:rPr>
+                          <a:rPr lang="el-GR" i="1">
+                            <a:latin typeface="Cambria Math" panose="02040503050406030204" pitchFamily="18" charset="0"/>
+                            <a:ea typeface="Cambria Math" panose="02040503050406030204" pitchFamily="18" charset="0"/>
+                          </a:rPr>
+                          <m:t>Σ</m:t>
+                        </m:r>
+                      </m:e>
+                      <m:sup>
+                        <m:r>
+                          <a:rPr lang="en-US" i="1">
+                            <a:latin typeface="Cambria Math" panose="02040503050406030204" pitchFamily="18" charset="0"/>
+                            <a:ea typeface="Cambria Math" panose="02040503050406030204" pitchFamily="18" charset="0"/>
+                          </a:rPr>
+                          <m:t>−1</m:t>
+                        </m:r>
+                      </m:sup>
+                    </m:sSup>
+                    <m:r>
+                      <a:rPr lang="en-US" b="0" i="1" smtClean="0">
+                        <a:latin typeface="Cambria Math" panose="02040503050406030204" pitchFamily="18" charset="0"/>
+                        <a:ea typeface="Cambria Math" panose="02040503050406030204" pitchFamily="18" charset="0"/>
+                      </a:rPr>
+                      <m:t>)</m:t>
+                    </m:r>
+                  </m:oMath>
+                </a14:m>
+                <a:endParaRPr lang="en-US" dirty="0" smtClean="0"/>
+              </a:p>
+              <a:p>
+                <a:pPr marL="914400" lvl="2" indent="0">
+                  <a:buNone/>
+                </a:pPr>
+                <a14:m>
+                  <m:oMathPara xmlns:m="http://schemas.openxmlformats.org/officeDocument/2006/math">
+                    <m:oMathParaPr>
+                      <m:jc m:val="centerGroup"/>
+                    </m:oMathParaPr>
+                    <m:oMath xmlns:m="http://schemas.openxmlformats.org/officeDocument/2006/math">
+                      <m:r>
+                        <a:rPr lang="en-US" b="0" i="1" smtClean="0">
+                          <a:latin typeface="Cambria Math" panose="02040503050406030204" pitchFamily="18" charset="0"/>
+                        </a:rPr>
+                        <m:t>𝑁𝑜𝑟𝑚𝑎𝑙</m:t>
+                      </m:r>
+                      <m:r>
+                        <a:rPr lang="en-US" b="0" i="1" smtClean="0">
+                          <a:latin typeface="Cambria Math" panose="02040503050406030204" pitchFamily="18" charset="0"/>
+                        </a:rPr>
+                        <m:t> </m:t>
+                      </m:r>
+                      <m:r>
+                        <a:rPr lang="en-US" b="0" i="1" smtClean="0">
+                          <a:latin typeface="Cambria Math" panose="02040503050406030204" pitchFamily="18" charset="0"/>
+                        </a:rPr>
+                        <m:t>𝑃𝐷𝐹</m:t>
+                      </m:r>
+                      <m:r>
+                        <a:rPr lang="en-US" b="0" i="1" smtClean="0">
+                          <a:latin typeface="Cambria Math" panose="02040503050406030204" pitchFamily="18" charset="0"/>
+                        </a:rPr>
+                        <m:t>: </m:t>
+                      </m:r>
+                      <m:func>
+                        <m:funcPr>
+                          <m:ctrlPr>
+                            <a:rPr lang="en-US" b="0" i="1" smtClean="0">
+                              <a:latin typeface="Cambria Math" panose="02040503050406030204" pitchFamily="18" charset="0"/>
+                            </a:rPr>
+                          </m:ctrlPr>
+                        </m:funcPr>
+                        <m:fName>
+                          <m:r>
+                            <m:rPr>
+                              <m:sty m:val="p"/>
+                            </m:rPr>
+                            <a:rPr lang="en-US" b="0" i="0" smtClean="0">
+                              <a:latin typeface="Cambria Math" panose="02040503050406030204" pitchFamily="18" charset="0"/>
+                            </a:rPr>
+                            <m:t>Pr</m:t>
+                          </m:r>
+                        </m:fName>
+                        <m:e>
+                          <m:d>
+                            <m:dPr>
+                              <m:ctrlPr>
+                                <a:rPr lang="en-US" b="0" i="1" smtClean="0">
+                                  <a:latin typeface="Cambria Math" panose="02040503050406030204" pitchFamily="18" charset="0"/>
+                                </a:rPr>
+                              </m:ctrlPr>
+                            </m:dPr>
+                            <m:e>
+                              <m:r>
+                                <a:rPr lang="en-US" i="1">
+                                  <a:latin typeface="Cambria Math"/>
+                                  <a:ea typeface="Cambria Math"/>
+                                </a:rPr>
+                                <m:t>𝜀</m:t>
+                              </m:r>
+                            </m:e>
+                            <m:e>
+                              <m:r>
+                                <a:rPr lang="en-US" b="0" i="1" smtClean="0">
+                                  <a:latin typeface="Cambria Math" panose="02040503050406030204" pitchFamily="18" charset="0"/>
+                                  <a:ea typeface="Cambria Math" panose="02040503050406030204" pitchFamily="18" charset="0"/>
+                                </a:rPr>
+                                <m:t>𝜇</m:t>
+                              </m:r>
+                              <m:r>
+                                <a:rPr lang="en-US" b="0" i="1" smtClean="0">
+                                  <a:latin typeface="Cambria Math" panose="02040503050406030204" pitchFamily="18" charset="0"/>
+                                  <a:ea typeface="Cambria Math" panose="02040503050406030204" pitchFamily="18" charset="0"/>
+                                </a:rPr>
+                                <m:t>,</m:t>
+                              </m:r>
+                              <m:r>
+                                <m:rPr>
+                                  <m:sty m:val="p"/>
+                                </m:rPr>
+                                <a:rPr lang="el-GR" b="0" i="1" smtClean="0">
+                                  <a:latin typeface="Cambria Math" panose="02040503050406030204" pitchFamily="18" charset="0"/>
+                                  <a:ea typeface="Cambria Math" panose="02040503050406030204" pitchFamily="18" charset="0"/>
+                                </a:rPr>
+                                <m:t>Σ</m:t>
+                              </m:r>
+                            </m:e>
+                          </m:d>
+                        </m:e>
+                      </m:func>
+                      <m:r>
+                        <a:rPr lang="en-US" b="0" i="1" smtClean="0">
+                          <a:latin typeface="Cambria Math" panose="02040503050406030204" pitchFamily="18" charset="0"/>
+                          <a:ea typeface="Cambria Math" panose="02040503050406030204" pitchFamily="18" charset="0"/>
+                        </a:rPr>
+                        <m:t>=</m:t>
+                      </m:r>
+                      <m:f>
+                        <m:fPr>
+                          <m:ctrlPr>
+                            <a:rPr lang="en-US" b="0" i="1" smtClean="0">
+                              <a:latin typeface="Cambria Math" panose="02040503050406030204" pitchFamily="18" charset="0"/>
+                              <a:ea typeface="Cambria Math" panose="02040503050406030204" pitchFamily="18" charset="0"/>
+                            </a:rPr>
+                          </m:ctrlPr>
+                        </m:fPr>
+                        <m:num>
+                          <m:r>
+                            <a:rPr lang="en-US" b="0" i="1" smtClean="0">
+                              <a:latin typeface="Cambria Math" panose="02040503050406030204" pitchFamily="18" charset="0"/>
+                              <a:ea typeface="Cambria Math" panose="02040503050406030204" pitchFamily="18" charset="0"/>
+                            </a:rPr>
+                            <m:t>1</m:t>
+                          </m:r>
+                        </m:num>
+                        <m:den>
+                          <m:sSup>
+                            <m:sSupPr>
+                              <m:ctrlPr>
+                                <a:rPr lang="en-US" b="0" i="1" smtClean="0">
+                                  <a:latin typeface="Cambria Math" panose="02040503050406030204" pitchFamily="18" charset="0"/>
+                                  <a:ea typeface="Cambria Math" panose="02040503050406030204" pitchFamily="18" charset="0"/>
+                                </a:rPr>
+                              </m:ctrlPr>
+                            </m:sSupPr>
+                            <m:e>
+                              <m:d>
+                                <m:dPr>
+                                  <m:ctrlPr>
+                                    <a:rPr lang="en-US" b="0" i="1" smtClean="0">
+                                      <a:latin typeface="Cambria Math" panose="02040503050406030204" pitchFamily="18" charset="0"/>
+                                      <a:ea typeface="Cambria Math" panose="02040503050406030204" pitchFamily="18" charset="0"/>
+                                    </a:rPr>
+                                  </m:ctrlPr>
+                                </m:dPr>
+                                <m:e>
+                                  <m:r>
+                                    <a:rPr lang="en-US" b="0" i="1" smtClean="0">
+                                      <a:latin typeface="Cambria Math" panose="02040503050406030204" pitchFamily="18" charset="0"/>
+                                      <a:ea typeface="Cambria Math" panose="02040503050406030204" pitchFamily="18" charset="0"/>
+                                    </a:rPr>
+                                    <m:t>2</m:t>
+                                  </m:r>
+                                  <m:r>
+                                    <a:rPr lang="en-US" b="0" i="1" smtClean="0">
+                                      <a:latin typeface="Cambria Math" panose="02040503050406030204" pitchFamily="18" charset="0"/>
+                                      <a:ea typeface="Cambria Math" panose="02040503050406030204" pitchFamily="18" charset="0"/>
+                                    </a:rPr>
+                                    <m:t>𝜋</m:t>
+                                  </m:r>
+                                </m:e>
+                              </m:d>
+                            </m:e>
+                            <m:sup>
+                              <m:r>
+                                <a:rPr lang="en-US" b="0" i="1" smtClean="0">
+                                  <a:latin typeface="Cambria Math" panose="02040503050406030204" pitchFamily="18" charset="0"/>
+                                  <a:ea typeface="Cambria Math" panose="02040503050406030204" pitchFamily="18" charset="0"/>
+                                </a:rPr>
+                                <m:t>𝑘</m:t>
+                              </m:r>
+                              <m:r>
+                                <a:rPr lang="en-US" b="0" i="1" smtClean="0">
+                                  <a:latin typeface="Cambria Math" panose="02040503050406030204" pitchFamily="18" charset="0"/>
+                                  <a:ea typeface="Cambria Math" panose="02040503050406030204" pitchFamily="18" charset="0"/>
+                                </a:rPr>
+                                <m:t>/2</m:t>
+                              </m:r>
+                            </m:sup>
+                          </m:sSup>
+                          <m:sSup>
+                            <m:sSupPr>
+                              <m:ctrlPr>
+                                <a:rPr lang="en-US" b="0" i="1" smtClean="0">
+                                  <a:latin typeface="Cambria Math" panose="02040503050406030204" pitchFamily="18" charset="0"/>
+                                  <a:ea typeface="Cambria Math" panose="02040503050406030204" pitchFamily="18" charset="0"/>
+                                </a:rPr>
+                              </m:ctrlPr>
+                            </m:sSupPr>
+                            <m:e>
+                              <m:d>
+                                <m:dPr>
+                                  <m:begChr m:val="|"/>
+                                  <m:endChr m:val="|"/>
+                                  <m:ctrlPr>
+                                    <a:rPr lang="en-US" b="0" i="1" smtClean="0">
+                                      <a:latin typeface="Cambria Math" panose="02040503050406030204" pitchFamily="18" charset="0"/>
+                                      <a:ea typeface="Cambria Math" panose="02040503050406030204" pitchFamily="18" charset="0"/>
+                                    </a:rPr>
+                                  </m:ctrlPr>
+                                </m:dPr>
+                                <m:e>
+                                  <m:r>
+                                    <m:rPr>
+                                      <m:sty m:val="p"/>
+                                    </m:rPr>
+                                    <a:rPr lang="el-GR" i="1">
+                                      <a:latin typeface="Cambria Math" panose="02040503050406030204" pitchFamily="18" charset="0"/>
+                                      <a:ea typeface="Cambria Math" panose="02040503050406030204" pitchFamily="18" charset="0"/>
+                                    </a:rPr>
+                                    <m:t>Σ</m:t>
+                                  </m:r>
+                                </m:e>
+                              </m:d>
+                            </m:e>
+                            <m:sup>
+                              <m:r>
+                                <a:rPr lang="en-US" b="0" i="1" smtClean="0">
+                                  <a:latin typeface="Cambria Math" panose="02040503050406030204" pitchFamily="18" charset="0"/>
+                                  <a:ea typeface="Cambria Math" panose="02040503050406030204" pitchFamily="18" charset="0"/>
+                                </a:rPr>
+                                <m:t>1/2</m:t>
+                              </m:r>
+                            </m:sup>
+                          </m:sSup>
+                        </m:den>
+                      </m:f>
+                      <m:r>
+                        <m:rPr>
+                          <m:sty m:val="p"/>
+                        </m:rPr>
+                        <a:rPr lang="en-US" b="0" i="0" smtClean="0">
+                          <a:latin typeface="Cambria Math" panose="02040503050406030204" pitchFamily="18" charset="0"/>
+                          <a:ea typeface="Cambria Math" panose="02040503050406030204" pitchFamily="18" charset="0"/>
+                        </a:rPr>
+                        <m:t>exp</m:t>
+                      </m:r>
+                      <m:r>
+                        <a:rPr lang="en-US" b="0" i="1" smtClean="0">
+                          <a:latin typeface="Cambria Math" panose="02040503050406030204" pitchFamily="18" charset="0"/>
+                          <a:ea typeface="Cambria Math" panose="02040503050406030204" pitchFamily="18" charset="0"/>
+                        </a:rPr>
+                        <m:t>⁡</m:t>
+                      </m:r>
+                      <m:d>
+                        <m:dPr>
+                          <m:ctrlPr>
+                            <a:rPr lang="en-US" b="0" i="1" smtClean="0">
+                              <a:latin typeface="Cambria Math" panose="02040503050406030204" pitchFamily="18" charset="0"/>
+                              <a:ea typeface="Cambria Math" panose="02040503050406030204" pitchFamily="18" charset="0"/>
+                            </a:rPr>
+                          </m:ctrlPr>
+                        </m:dPr>
+                        <m:e>
+                          <m:f>
+                            <m:fPr>
+                              <m:ctrlPr>
+                                <a:rPr lang="en-US" i="1">
+                                  <a:latin typeface="Cambria Math" panose="02040503050406030204" pitchFamily="18" charset="0"/>
+                                  <a:ea typeface="Cambria Math" panose="02040503050406030204" pitchFamily="18" charset="0"/>
+                                </a:rPr>
+                              </m:ctrlPr>
+                            </m:fPr>
+                            <m:num>
+                              <m:r>
+                                <a:rPr lang="en-US" i="1">
+                                  <a:latin typeface="Cambria Math" panose="02040503050406030204" pitchFamily="18" charset="0"/>
+                                  <a:ea typeface="Cambria Math" panose="02040503050406030204" pitchFamily="18" charset="0"/>
+                                </a:rPr>
+                                <m:t>−</m:t>
+                              </m:r>
+                              <m:sSup>
+                                <m:sSupPr>
+                                  <m:ctrlPr>
+                                    <a:rPr lang="en-US" i="1">
+                                      <a:latin typeface="Cambria Math" panose="02040503050406030204" pitchFamily="18" charset="0"/>
+                                      <a:ea typeface="Cambria Math" panose="02040503050406030204" pitchFamily="18" charset="0"/>
+                                    </a:rPr>
+                                  </m:ctrlPr>
+                                </m:sSupPr>
+                                <m:e>
+                                  <m:d>
+                                    <m:dPr>
+                                      <m:ctrlPr>
+                                        <a:rPr lang="en-US" i="1">
+                                          <a:latin typeface="Cambria Math" panose="02040503050406030204" pitchFamily="18" charset="0"/>
+                                          <a:ea typeface="Cambria Math" panose="02040503050406030204" pitchFamily="18" charset="0"/>
+                                        </a:rPr>
+                                      </m:ctrlPr>
+                                    </m:dPr>
+                                    <m:e>
+                                      <m:r>
+                                        <a:rPr lang="en-US" i="1">
+                                          <a:latin typeface="Cambria Math"/>
+                                          <a:ea typeface="Cambria Math"/>
+                                        </a:rPr>
+                                        <m:t>𝜀</m:t>
+                                      </m:r>
+                                      <m:r>
+                                        <a:rPr lang="en-US" i="1">
+                                          <a:latin typeface="Cambria Math" panose="02040503050406030204" pitchFamily="18" charset="0"/>
+                                          <a:ea typeface="Cambria Math"/>
+                                        </a:rPr>
+                                        <m:t>−</m:t>
+                                      </m:r>
+                                      <m:r>
+                                        <a:rPr lang="en-US" i="1">
+                                          <a:latin typeface="Cambria Math" panose="02040503050406030204" pitchFamily="18" charset="0"/>
+                                          <a:ea typeface="Cambria Math" panose="02040503050406030204" pitchFamily="18" charset="0"/>
+                                        </a:rPr>
+                                        <m:t>𝜇</m:t>
+                                      </m:r>
+                                    </m:e>
+                                  </m:d>
+                                </m:e>
+                                <m:sup>
+                                  <m:r>
+                                    <m:rPr>
+                                      <m:sty m:val="p"/>
+                                    </m:rPr>
+                                    <a:rPr lang="en-US">
+                                      <a:latin typeface="Cambria Math" panose="02040503050406030204" pitchFamily="18" charset="0"/>
+                                      <a:ea typeface="Cambria Math" panose="02040503050406030204" pitchFamily="18" charset="0"/>
+                                    </a:rPr>
+                                    <m:t>T</m:t>
+                                  </m:r>
+                                </m:sup>
+                              </m:sSup>
+                              <m:sSup>
+                                <m:sSupPr>
+                                  <m:ctrlPr>
+                                    <a:rPr lang="en-US" i="1">
+                                      <a:latin typeface="Cambria Math" panose="02040503050406030204" pitchFamily="18" charset="0"/>
+                                      <a:ea typeface="Cambria Math" panose="02040503050406030204" pitchFamily="18" charset="0"/>
+                                    </a:rPr>
+                                  </m:ctrlPr>
+                                </m:sSupPr>
+                                <m:e>
+                                  <m:r>
+                                    <m:rPr>
+                                      <m:sty m:val="p"/>
+                                    </m:rPr>
+                                    <a:rPr lang="el-GR" i="1">
+                                      <a:latin typeface="Cambria Math" panose="02040503050406030204" pitchFamily="18" charset="0"/>
+                                      <a:ea typeface="Cambria Math" panose="02040503050406030204" pitchFamily="18" charset="0"/>
+                                    </a:rPr>
+                                    <m:t>Σ</m:t>
+                                  </m:r>
+                                </m:e>
+                                <m:sup>
+                                  <m:r>
+                                    <a:rPr lang="en-US" i="1">
+                                      <a:latin typeface="Cambria Math" panose="02040503050406030204" pitchFamily="18" charset="0"/>
+                                      <a:ea typeface="Cambria Math" panose="02040503050406030204" pitchFamily="18" charset="0"/>
+                                    </a:rPr>
+                                    <m:t>−1</m:t>
+                                  </m:r>
+                                </m:sup>
+                              </m:sSup>
+                              <m:d>
+                                <m:dPr>
+                                  <m:ctrlPr>
+                                    <a:rPr lang="en-US" i="1">
+                                      <a:latin typeface="Cambria Math" panose="02040503050406030204" pitchFamily="18" charset="0"/>
+                                      <a:ea typeface="Cambria Math" panose="02040503050406030204" pitchFamily="18" charset="0"/>
+                                    </a:rPr>
+                                  </m:ctrlPr>
+                                </m:dPr>
+                                <m:e>
+                                  <m:r>
+                                    <a:rPr lang="en-US" i="1">
+                                      <a:latin typeface="Cambria Math"/>
+                                      <a:ea typeface="Cambria Math"/>
+                                    </a:rPr>
+                                    <m:t>𝜀</m:t>
+                                  </m:r>
+                                  <m:r>
+                                    <a:rPr lang="en-US" i="1">
+                                      <a:latin typeface="Cambria Math" panose="02040503050406030204" pitchFamily="18" charset="0"/>
+                                      <a:ea typeface="Cambria Math"/>
+                                    </a:rPr>
+                                    <m:t>−</m:t>
+                                  </m:r>
+                                  <m:r>
+                                    <a:rPr lang="en-US" i="1">
+                                      <a:latin typeface="Cambria Math" panose="02040503050406030204" pitchFamily="18" charset="0"/>
+                                      <a:ea typeface="Cambria Math" panose="02040503050406030204" pitchFamily="18" charset="0"/>
+                                    </a:rPr>
+                                    <m:t>𝜇</m:t>
+                                  </m:r>
+                                </m:e>
+                              </m:d>
+                            </m:num>
+                            <m:den>
+                              <m:r>
+                                <a:rPr lang="en-US" i="1">
+                                  <a:latin typeface="Cambria Math" panose="02040503050406030204" pitchFamily="18" charset="0"/>
+                                  <a:ea typeface="Cambria Math" panose="02040503050406030204" pitchFamily="18" charset="0"/>
+                                </a:rPr>
+                                <m:t>2</m:t>
+                              </m:r>
+                            </m:den>
+                          </m:f>
+                        </m:e>
+                      </m:d>
+                    </m:oMath>
+                  </m:oMathPara>
+                </a14:m>
                 <a:endParaRPr lang="en-US" dirty="0"/>
               </a:p>
             </p:txBody>
@@ -7982,7 +9131,7 @@
               <a:blipFill>
                 <a:blip r:embed="rId2"/>
                 <a:stretch>
-                  <a:fillRect l="-271" t="-923"/>
+                  <a:fillRect l="-1085" t="-1436"/>
                 </a:stretch>
               </a:blipFill>
             </p:spPr>
@@ -8004,7 +9153,7 @@
     </p:spTree>
     <p:extLst>
       <p:ext uri="{BB962C8B-B14F-4D97-AF65-F5344CB8AC3E}">
-        <p14:creationId xmlns:p14="http://schemas.microsoft.com/office/powerpoint/2010/main" val="3720437709"/>
+        <p14:creationId xmlns:p14="http://schemas.microsoft.com/office/powerpoint/2010/main" val="3537833877"/>
       </p:ext>
     </p:extLst>
   </p:cSld>
@@ -8021,7 +9170,7 @@
 </p:sld>
 </file>
 
-<file path=ppt/slides/slide15.xml><?xml version="1.0" encoding="utf-8"?>
+<file path=ppt/slides/slide16.xml><?xml version="1.0" encoding="utf-8"?>
 <p:sld xmlns:a="http://schemas.openxmlformats.org/drawingml/2006/main" xmlns:r="http://schemas.openxmlformats.org/officeDocument/2006/relationships" xmlns:p="http://schemas.openxmlformats.org/presentationml/2006/main">
   <p:cSld>
     <p:spTree>
@@ -8060,8 +9209,8 @@
           </a:p>
         </p:txBody>
       </p:sp>
-      <mc:AlternateContent xmlns:mc="http://schemas.openxmlformats.org/markup-compatibility/2006" xmlns:a14="http://schemas.microsoft.com/office/drawing/2010/main">
-        <mc:Choice Requires="a14">
+      <mc:AlternateContent xmlns:mc="http://schemas.openxmlformats.org/markup-compatibility/2006">
+        <mc:Choice xmlns:a14="http://schemas.microsoft.com/office/drawing/2010/main" Requires="a14">
           <p:sp>
             <p:nvSpPr>
               <p:cNvPr id="3" name="Content Placeholder 2"/>
@@ -8075,7 +9224,7 @@
             <p:spPr/>
             <p:txBody>
               <a:bodyPr>
-                <a:normAutofit fontScale="55000" lnSpcReduction="20000"/>
+                <a:normAutofit fontScale="47500" lnSpcReduction="20000"/>
               </a:bodyPr>
               <a:lstStyle/>
               <a:p>
@@ -8261,6 +9410,137 @@
                           </m:r>
                         </m:den>
                       </m:f>
+                    </m:oMath>
+                  </m:oMathPara>
+                </a14:m>
+                <a:endParaRPr lang="en-US" b="0" dirty="0" smtClean="0"/>
+              </a:p>
+              <a:p>
+                <a:pPr marL="0" indent="0">
+                  <a:buNone/>
+                </a:pPr>
+                <a:r>
+                  <a:rPr lang="en-US" sz="4000" dirty="0" smtClean="0"/>
+                  <a:t>Defining the log-likelihood</a:t>
+                </a:r>
+              </a:p>
+              <a:p>
+                <a:pPr marL="0" indent="0">
+                  <a:buNone/>
+                </a:pPr>
+                <a14:m>
+                  <m:oMathPara xmlns:m="http://schemas.openxmlformats.org/officeDocument/2006/math">
+                    <m:oMathParaPr>
+                      <m:jc m:val="centerGroup"/>
+                    </m:oMathParaPr>
+                    <m:oMath xmlns:m="http://schemas.openxmlformats.org/officeDocument/2006/math">
+                      <m:func>
+                        <m:funcPr>
+                          <m:ctrlPr>
+                            <a:rPr lang="en-US" b="0" i="1" smtClean="0">
+                              <a:latin typeface="Cambria Math" panose="02040503050406030204" pitchFamily="18" charset="0"/>
+                            </a:rPr>
+                          </m:ctrlPr>
+                        </m:funcPr>
+                        <m:fName>
+                          <m:r>
+                            <m:rPr>
+                              <m:sty m:val="p"/>
+                            </m:rPr>
+                            <a:rPr lang="en-US" b="0" i="0" smtClean="0">
+                              <a:latin typeface="Cambria Math" panose="02040503050406030204" pitchFamily="18" charset="0"/>
+                            </a:rPr>
+                            <m:t>log</m:t>
+                          </m:r>
+                        </m:fName>
+                        <m:e>
+                          <m:d>
+                            <m:dPr>
+                              <m:ctrlPr>
+                                <a:rPr lang="en-US" b="0" i="1" smtClean="0">
+                                  <a:latin typeface="Cambria Math" panose="02040503050406030204" pitchFamily="18" charset="0"/>
+                                </a:rPr>
+                              </m:ctrlPr>
+                            </m:dPr>
+                            <m:e>
+                              <m:func>
+                                <m:funcPr>
+                                  <m:ctrlPr>
+                                    <a:rPr lang="en-US" b="0" i="1" smtClean="0">
+                                      <a:latin typeface="Cambria Math" panose="02040503050406030204" pitchFamily="18" charset="0"/>
+                                    </a:rPr>
+                                  </m:ctrlPr>
+                                </m:funcPr>
+                                <m:fName>
+                                  <m:r>
+                                    <m:rPr>
+                                      <m:sty m:val="p"/>
+                                    </m:rPr>
+                                    <a:rPr lang="en-US" b="0" i="0" smtClean="0">
+                                      <a:latin typeface="Cambria Math" panose="02040503050406030204" pitchFamily="18" charset="0"/>
+                                    </a:rPr>
+                                    <m:t>Pr</m:t>
+                                  </m:r>
+                                </m:fName>
+                                <m:e>
+                                  <m:d>
+                                    <m:dPr>
+                                      <m:ctrlPr>
+                                        <a:rPr lang="en-US" b="0" i="1" smtClean="0">
+                                          <a:latin typeface="Cambria Math" panose="02040503050406030204" pitchFamily="18" charset="0"/>
+                                        </a:rPr>
+                                      </m:ctrlPr>
+                                    </m:dPr>
+                                    <m:e>
+                                      <m:r>
+                                        <a:rPr lang="en-US" b="0" i="1" smtClean="0">
+                                          <a:latin typeface="Cambria Math" panose="02040503050406030204" pitchFamily="18" charset="0"/>
+                                        </a:rPr>
+                                        <m:t>𝑥</m:t>
+                                      </m:r>
+                                    </m:e>
+                                  </m:d>
+                                </m:e>
+                              </m:func>
+                            </m:e>
+                          </m:d>
+                        </m:e>
+                      </m:func>
+                      <m:r>
+                        <a:rPr lang="en-US" i="1">
+                          <a:latin typeface="Cambria Math" panose="02040503050406030204" pitchFamily="18" charset="0"/>
+                          <a:ea typeface="Cambria Math" panose="02040503050406030204" pitchFamily="18" charset="0"/>
+                        </a:rPr>
+                        <m:t>≡</m:t>
+                      </m:r>
+                      <m:r>
+                        <a:rPr lang="en-US" b="0" i="1" smtClean="0">
+                          <a:latin typeface="Cambria Math" panose="02040503050406030204" pitchFamily="18" charset="0"/>
+                          <a:ea typeface="Cambria Math" panose="02040503050406030204" pitchFamily="18" charset="0"/>
+                        </a:rPr>
+                        <m:t>𝑓</m:t>
+                      </m:r>
+                      <m:r>
+                        <a:rPr lang="en-US" b="0" i="1" smtClean="0">
+                          <a:latin typeface="Cambria Math" panose="02040503050406030204" pitchFamily="18" charset="0"/>
+                          <a:ea typeface="Cambria Math" panose="02040503050406030204" pitchFamily="18" charset="0"/>
+                        </a:rPr>
+                        <m:t>(</m:t>
+                      </m:r>
+                      <m:r>
+                        <a:rPr lang="en-US" b="0" i="1" smtClean="0">
+                          <a:latin typeface="Cambria Math" panose="02040503050406030204" pitchFamily="18" charset="0"/>
+                          <a:ea typeface="Cambria Math" panose="02040503050406030204" pitchFamily="18" charset="0"/>
+                        </a:rPr>
+                        <m:t>𝑥</m:t>
+                      </m:r>
+                      <m:r>
+                        <a:rPr lang="en-US" b="0" i="1" smtClean="0">
+                          <a:latin typeface="Cambria Math" panose="02040503050406030204" pitchFamily="18" charset="0"/>
+                          <a:ea typeface="Cambria Math" panose="02040503050406030204" pitchFamily="18" charset="0"/>
+                        </a:rPr>
+                        <m:t>)</m:t>
+                      </m:r>
                     </m:oMath>
                   </m:oMathPara>
                 </a14:m>
@@ -9148,7 +10428,7 @@
             </p:txBody>
           </p:sp>
         </mc:Choice>
-        <mc:Fallback xmlns="">
+        <mc:Fallback>
           <p:sp>
             <p:nvSpPr>
               <p:cNvPr id="3" name="Content Placeholder 2"/>
@@ -9163,7 +10443,7 @@
               <a:blipFill>
                 <a:blip r:embed="rId2"/>
                 <a:stretch>
-                  <a:fillRect l="-1831" t="-2872"/>
+                  <a:fillRect l="-1492" t="-2359"/>
                 </a:stretch>
               </a:blipFill>
             </p:spPr>
@@ -9202,7 +10482,7 @@
 </p:sld>
 </file>
 
-<file path=ppt/slides/slide16.xml><?xml version="1.0" encoding="utf-8"?>
+<file path=ppt/slides/slide17.xml><?xml version="1.0" encoding="utf-8"?>
 <p:sld xmlns:a="http://schemas.openxmlformats.org/drawingml/2006/main" xmlns:r="http://schemas.openxmlformats.org/officeDocument/2006/relationships" xmlns:p="http://schemas.openxmlformats.org/presentationml/2006/main">
   <p:cSld>
     <p:spTree>
@@ -9260,7 +10540,7 @@
             <a:fld id="{E0FF4530-C0A9-489F-AD78-78B1E4B1E710}" type="slidenum">
               <a:rPr lang="en-US" smtClean="0"/>
               <a:pPr/>
-              <a:t>16</a:t>
+              <a:t>17</a:t>
             </a:fld>
             <a:endParaRPr lang="en-US"/>
           </a:p>
@@ -9316,7 +10596,7 @@
 </p:sld>
 </file>
 
-<file path=ppt/slides/slide17.xml><?xml version="1.0" encoding="utf-8"?>
+<file path=ppt/slides/slide18.xml><?xml version="1.0" encoding="utf-8"?>
 <p:sld xmlns:a="http://schemas.openxmlformats.org/drawingml/2006/main" xmlns:r="http://schemas.openxmlformats.org/officeDocument/2006/relationships" xmlns:p="http://schemas.openxmlformats.org/presentationml/2006/main">
   <p:cSld>
     <p:spTree>
@@ -10436,7 +11716,7 @@
 </p:sld>
 </file>
 
-<file path=ppt/slides/slide18.xml><?xml version="1.0" encoding="utf-8"?>
+<file path=ppt/slides/slide19.xml><?xml version="1.0" encoding="utf-8"?>
 <p:sld xmlns:a="http://schemas.openxmlformats.org/drawingml/2006/main" xmlns:r="http://schemas.openxmlformats.org/officeDocument/2006/relationships" xmlns:p="http://schemas.openxmlformats.org/presentationml/2006/main">
   <p:cSld>
     <p:spTree>
@@ -11473,641 +12753,6 @@
     <p:extLst>
       <p:ext uri="{BB962C8B-B14F-4D97-AF65-F5344CB8AC3E}">
         <p14:creationId xmlns:p14="http://schemas.microsoft.com/office/powerpoint/2010/main" val="2721142719"/>
-      </p:ext>
-    </p:extLst>
-  </p:cSld>
-  <p:clrMapOvr>
-    <a:masterClrMapping/>
-  </p:clrMapOvr>
-  <p:timing>
-    <p:tnLst>
-      <p:par>
-        <p:cTn id="1" dur="indefinite" restart="never" nodeType="tmRoot"/>
-      </p:par>
-    </p:tnLst>
-  </p:timing>
-</p:sld>
-</file>
-
-<file path=ppt/slides/slide19.xml><?xml version="1.0" encoding="utf-8"?>
-<p:sld xmlns:a="http://schemas.openxmlformats.org/drawingml/2006/main" xmlns:r="http://schemas.openxmlformats.org/officeDocument/2006/relationships" xmlns:p="http://schemas.openxmlformats.org/presentationml/2006/main">
-  <p:cSld>
-    <p:spTree>
-      <p:nvGrpSpPr>
-        <p:cNvPr id="1" name=""/>
-        <p:cNvGrpSpPr/>
-        <p:nvPr/>
-      </p:nvGrpSpPr>
-      <p:grpSpPr>
-        <a:xfrm>
-          <a:off x="0" y="0"/>
-          <a:ext cx="0" cy="0"/>
-          <a:chOff x="0" y="0"/>
-          <a:chExt cx="0" cy="0"/>
-        </a:xfrm>
-      </p:grpSpPr>
-      <p:sp>
-        <p:nvSpPr>
-          <p:cNvPr id="2" name="Title 1"/>
-          <p:cNvSpPr>
-            <a:spLocks noGrp="1"/>
-          </p:cNvSpPr>
-          <p:nvPr>
-            <p:ph type="title"/>
-          </p:nvPr>
-        </p:nvSpPr>
-        <p:spPr/>
-        <p:txBody>
-          <a:bodyPr/>
-          <a:lstStyle/>
-          <a:p>
-            <a:endParaRPr lang="en-US"/>
-          </a:p>
-        </p:txBody>
-      </p:sp>
-      <mc:AlternateContent xmlns:mc="http://schemas.openxmlformats.org/markup-compatibility/2006" xmlns:a14="http://schemas.microsoft.com/office/drawing/2010/main">
-        <mc:Choice Requires="a14">
-          <p:sp>
-            <p:nvSpPr>
-              <p:cNvPr id="3" name="Content Placeholder 2"/>
-              <p:cNvSpPr>
-                <a:spLocks noGrp="1"/>
-              </p:cNvSpPr>
-              <p:nvPr>
-                <p:ph idx="1"/>
-              </p:nvPr>
-            </p:nvSpPr>
-            <p:spPr/>
-            <p:txBody>
-              <a:bodyPr>
-                <a:normAutofit/>
-              </a:bodyPr>
-              <a:lstStyle/>
-              <a:p>
-                <a:pPr marL="0" indent="0">
-                  <a:buNone/>
-                </a:pPr>
-                <a:r>
-                  <a:rPr lang="en-US" sz="3600" dirty="0" smtClean="0"/>
-                  <a:t>Generalized linear mixed model</a:t>
-                </a:r>
-              </a:p>
-              <a:p>
-                <a:pPr marL="971550" lvl="1" indent="-514350">
-                  <a:buFont typeface="+mj-lt"/>
-                  <a:buAutoNum type="arabicPeriod"/>
-                </a:pPr>
-                <a:r>
-                  <a:rPr lang="en-US" sz="3200" dirty="0" smtClean="0">
-                    <a:solidFill>
-                      <a:schemeClr val="tx1"/>
-                    </a:solidFill>
-                  </a:rPr>
-                  <a:t>Specify distribution for response variable</a:t>
-                </a:r>
-              </a:p>
-              <a:p>
-                <a:pPr marL="914400" lvl="2" indent="0">
-                  <a:buNone/>
-                </a:pPr>
-                <a14:m>
-                  <m:oMathPara xmlns:m="http://schemas.openxmlformats.org/officeDocument/2006/math">
-                    <m:oMathParaPr>
-                      <m:jc m:val="centerGroup"/>
-                    </m:oMathParaPr>
-                    <m:oMath xmlns:m="http://schemas.openxmlformats.org/officeDocument/2006/math">
-                      <m:sSub>
-                        <m:sSubPr>
-                          <m:ctrlPr>
-                            <a:rPr lang="en-US" sz="2800" b="0" i="1" smtClean="0">
-                              <a:solidFill>
-                                <a:schemeClr val="tx1"/>
-                              </a:solidFill>
-                              <a:latin typeface="Cambria Math" panose="02040503050406030204" pitchFamily="18" charset="0"/>
-                            </a:rPr>
-                          </m:ctrlPr>
-                        </m:sSubPr>
-                        <m:e>
-                          <m:r>
-                            <a:rPr lang="en-US" sz="2800" b="0" i="1" smtClean="0">
-                              <a:solidFill>
-                                <a:schemeClr val="tx1"/>
-                              </a:solidFill>
-                              <a:latin typeface="Cambria Math" panose="02040503050406030204" pitchFamily="18" charset="0"/>
-                            </a:rPr>
-                            <m:t>𝑐</m:t>
-                          </m:r>
-                        </m:e>
-                        <m:sub>
-                          <m:r>
-                            <a:rPr lang="en-US" sz="2800" b="0" i="1" smtClean="0">
-                              <a:solidFill>
-                                <a:schemeClr val="tx1"/>
-                              </a:solidFill>
-                              <a:latin typeface="Cambria Math" panose="02040503050406030204" pitchFamily="18" charset="0"/>
-                            </a:rPr>
-                            <m:t>𝑖</m:t>
-                          </m:r>
-                        </m:sub>
-                      </m:sSub>
-                      <m:r>
-                        <a:rPr lang="en-US" sz="2800" b="0" i="1" smtClean="0">
-                          <a:solidFill>
-                            <a:schemeClr val="tx1"/>
-                          </a:solidFill>
-                          <a:latin typeface="Cambria Math" panose="02040503050406030204" pitchFamily="18" charset="0"/>
-                        </a:rPr>
-                        <m:t>~</m:t>
-                      </m:r>
-                      <m:r>
-                        <m:rPr>
-                          <m:sty m:val="p"/>
-                        </m:rPr>
-                        <a:rPr lang="en-US" sz="2800" b="0" i="0" smtClean="0">
-                          <a:solidFill>
-                            <a:schemeClr val="tx1"/>
-                          </a:solidFill>
-                          <a:latin typeface="Cambria Math" panose="02040503050406030204" pitchFamily="18" charset="0"/>
-                        </a:rPr>
-                        <m:t>Poisson</m:t>
-                      </m:r>
-                      <m:r>
-                        <a:rPr lang="en-US" sz="2800" b="0" i="1" smtClean="0">
-                          <a:solidFill>
-                            <a:schemeClr val="tx1"/>
-                          </a:solidFill>
-                          <a:latin typeface="Cambria Math" panose="02040503050406030204" pitchFamily="18" charset="0"/>
-                        </a:rPr>
-                        <m:t>(</m:t>
-                      </m:r>
-                      <m:sSub>
-                        <m:sSubPr>
-                          <m:ctrlPr>
-                            <a:rPr lang="en-US" sz="2800" b="0" i="1" smtClean="0">
-                              <a:solidFill>
-                                <a:schemeClr val="tx1"/>
-                              </a:solidFill>
-                              <a:latin typeface="Cambria Math" panose="02040503050406030204" pitchFamily="18" charset="0"/>
-                              <a:ea typeface="Cambria Math" panose="02040503050406030204" pitchFamily="18" charset="0"/>
-                            </a:rPr>
-                          </m:ctrlPr>
-                        </m:sSubPr>
-                        <m:e>
-                          <m:r>
-                            <a:rPr lang="en-US" sz="2800" b="0" i="1" smtClean="0">
-                              <a:solidFill>
-                                <a:schemeClr val="tx1"/>
-                              </a:solidFill>
-                              <a:latin typeface="Cambria Math" panose="02040503050406030204" pitchFamily="18" charset="0"/>
-                              <a:ea typeface="Cambria Math" panose="02040503050406030204" pitchFamily="18" charset="0"/>
-                            </a:rPr>
-                            <m:t>𝜆</m:t>
-                          </m:r>
-                        </m:e>
-                        <m:sub>
-                          <m:r>
-                            <a:rPr lang="en-US" sz="2800" b="0" i="1" smtClean="0">
-                              <a:solidFill>
-                                <a:schemeClr val="tx1"/>
-                              </a:solidFill>
-                              <a:latin typeface="Cambria Math" panose="02040503050406030204" pitchFamily="18" charset="0"/>
-                              <a:ea typeface="Cambria Math" panose="02040503050406030204" pitchFamily="18" charset="0"/>
-                            </a:rPr>
-                            <m:t>𝑖</m:t>
-                          </m:r>
-                        </m:sub>
-                      </m:sSub>
-                      <m:r>
-                        <a:rPr lang="en-US" sz="2800" b="0" i="1" smtClean="0">
-                          <a:solidFill>
-                            <a:schemeClr val="tx1"/>
-                          </a:solidFill>
-                          <a:latin typeface="Cambria Math" panose="02040503050406030204" pitchFamily="18" charset="0"/>
-                          <a:ea typeface="Cambria Math" panose="02040503050406030204" pitchFamily="18" charset="0"/>
-                        </a:rPr>
-                        <m:t>)</m:t>
-                      </m:r>
-                    </m:oMath>
-                  </m:oMathPara>
-                </a14:m>
-                <a:endParaRPr lang="en-US" sz="2800" dirty="0">
-                  <a:solidFill>
-                    <a:schemeClr val="tx1"/>
-                  </a:solidFill>
-                </a:endParaRPr>
-              </a:p>
-              <a:p>
-                <a:pPr marL="971550" lvl="1" indent="-514350">
-                  <a:buFont typeface="+mj-lt"/>
-                  <a:buAutoNum type="arabicPeriod"/>
-                </a:pPr>
-                <a:r>
-                  <a:rPr lang="en-US" sz="3200" dirty="0">
-                    <a:solidFill>
-                      <a:schemeClr val="tx1"/>
-                    </a:solidFill>
-                  </a:rPr>
-                  <a:t>Specify function for expected value</a:t>
-                </a:r>
-              </a:p>
-              <a:p>
-                <a:pPr marL="914400" lvl="2" indent="0">
-                  <a:buNone/>
-                </a:pPr>
-                <a14:m>
-                  <m:oMathPara xmlns:m="http://schemas.openxmlformats.org/officeDocument/2006/math">
-                    <m:oMathParaPr>
-                      <m:jc m:val="centerGroup"/>
-                    </m:oMathParaPr>
-                    <m:oMath xmlns:m="http://schemas.openxmlformats.org/officeDocument/2006/math">
-                      <m:sSub>
-                        <m:sSubPr>
-                          <m:ctrlPr>
-                            <a:rPr lang="en-US" sz="2800" i="1">
-                              <a:latin typeface="Cambria Math" panose="02040503050406030204" pitchFamily="18" charset="0"/>
-                              <a:ea typeface="Cambria Math" panose="02040503050406030204" pitchFamily="18" charset="0"/>
-                            </a:rPr>
-                          </m:ctrlPr>
-                        </m:sSubPr>
-                        <m:e>
-                          <m:r>
-                            <a:rPr lang="en-US" sz="2800" i="1">
-                              <a:latin typeface="Cambria Math" panose="02040503050406030204" pitchFamily="18" charset="0"/>
-                              <a:ea typeface="Cambria Math" panose="02040503050406030204" pitchFamily="18" charset="0"/>
-                            </a:rPr>
-                            <m:t>𝜆</m:t>
-                          </m:r>
-                        </m:e>
-                        <m:sub>
-                          <m:r>
-                            <a:rPr lang="en-US" sz="2800" i="1">
-                              <a:latin typeface="Cambria Math" panose="02040503050406030204" pitchFamily="18" charset="0"/>
-                              <a:ea typeface="Cambria Math" panose="02040503050406030204" pitchFamily="18" charset="0"/>
-                            </a:rPr>
-                            <m:t>𝑖</m:t>
-                          </m:r>
-                        </m:sub>
-                      </m:sSub>
-                      <m:r>
-                        <a:rPr lang="en-US" sz="2800" b="0" i="1" smtClean="0">
-                          <a:latin typeface="Cambria Math" panose="02040503050406030204" pitchFamily="18" charset="0"/>
-                          <a:ea typeface="Cambria Math" panose="02040503050406030204" pitchFamily="18" charset="0"/>
-                        </a:rPr>
-                        <m:t>=</m:t>
-                      </m:r>
-                      <m:r>
-                        <m:rPr>
-                          <m:sty m:val="p"/>
-                        </m:rPr>
-                        <a:rPr lang="en-US" sz="2800" b="0" i="0" smtClean="0">
-                          <a:latin typeface="Cambria Math" panose="02040503050406030204" pitchFamily="18" charset="0"/>
-                          <a:ea typeface="Cambria Math" panose="02040503050406030204" pitchFamily="18" charset="0"/>
-                        </a:rPr>
-                        <m:t>exp</m:t>
-                      </m:r>
-                      <m:r>
-                        <a:rPr lang="en-US" sz="2800" b="0" i="1" smtClean="0">
-                          <a:latin typeface="Cambria Math" panose="02040503050406030204" pitchFamily="18" charset="0"/>
-                          <a:ea typeface="Cambria Math" panose="02040503050406030204" pitchFamily="18" charset="0"/>
-                        </a:rPr>
-                        <m:t>⁡(</m:t>
-                      </m:r>
-                      <m:sSub>
-                        <m:sSubPr>
-                          <m:ctrlPr>
-                            <a:rPr lang="en-US" sz="2800" b="0" i="1" smtClean="0">
-                              <a:latin typeface="Cambria Math" panose="02040503050406030204" pitchFamily="18" charset="0"/>
-                              <a:ea typeface="Cambria Math" panose="02040503050406030204" pitchFamily="18" charset="0"/>
-                            </a:rPr>
-                          </m:ctrlPr>
-                        </m:sSubPr>
-                        <m:e>
-                          <m:r>
-                            <a:rPr lang="en-US" sz="2800" b="0" i="1" smtClean="0">
-                              <a:latin typeface="Cambria Math" panose="02040503050406030204" pitchFamily="18" charset="0"/>
-                              <a:ea typeface="Cambria Math" panose="02040503050406030204" pitchFamily="18" charset="0"/>
-                            </a:rPr>
-                            <m:t>𝛽</m:t>
-                          </m:r>
-                        </m:e>
-                        <m:sub>
-                          <m:r>
-                            <a:rPr lang="en-US" sz="2800" b="0" i="1" smtClean="0">
-                              <a:latin typeface="Cambria Math" panose="02040503050406030204" pitchFamily="18" charset="0"/>
-                              <a:ea typeface="Cambria Math" panose="02040503050406030204" pitchFamily="18" charset="0"/>
-                            </a:rPr>
-                            <m:t>0</m:t>
-                          </m:r>
-                        </m:sub>
-                      </m:sSub>
-                      <m:r>
-                        <a:rPr lang="en-US" sz="2800" b="0" i="1" smtClean="0">
-                          <a:latin typeface="Cambria Math" panose="02040503050406030204" pitchFamily="18" charset="0"/>
-                          <a:ea typeface="Cambria Math" panose="02040503050406030204" pitchFamily="18" charset="0"/>
-                        </a:rPr>
-                        <m:t>+</m:t>
-                      </m:r>
-                      <m:r>
-                        <a:rPr lang="en-US" sz="2800" b="1" i="0" smtClean="0">
-                          <a:latin typeface="Cambria Math" panose="02040503050406030204" pitchFamily="18" charset="0"/>
-                          <a:ea typeface="Cambria Math" panose="02040503050406030204" pitchFamily="18" charset="0"/>
-                        </a:rPr>
-                        <m:t>𝛃</m:t>
-                      </m:r>
-                      <m:sSub>
-                        <m:sSubPr>
-                          <m:ctrlPr>
-                            <a:rPr lang="en-US" sz="2800" b="0" i="1" smtClean="0">
-                              <a:latin typeface="Cambria Math" panose="02040503050406030204" pitchFamily="18" charset="0"/>
-                              <a:ea typeface="Cambria Math" panose="02040503050406030204" pitchFamily="18" charset="0"/>
-                            </a:rPr>
-                          </m:ctrlPr>
-                        </m:sSubPr>
-                        <m:e>
-                          <m:r>
-                            <a:rPr lang="en-US" sz="2800" b="1" i="0" smtClean="0">
-                              <a:latin typeface="Cambria Math" panose="02040503050406030204" pitchFamily="18" charset="0"/>
-                              <a:ea typeface="Cambria Math" panose="02040503050406030204" pitchFamily="18" charset="0"/>
-                            </a:rPr>
-                            <m:t>𝐱</m:t>
-                          </m:r>
-                        </m:e>
-                        <m:sub>
-                          <m:r>
-                            <a:rPr lang="en-US" sz="2800" b="0" i="1" smtClean="0">
-                              <a:latin typeface="Cambria Math" panose="02040503050406030204" pitchFamily="18" charset="0"/>
-                              <a:ea typeface="Cambria Math" panose="02040503050406030204" pitchFamily="18" charset="0"/>
-                            </a:rPr>
-                            <m:t>𝑖</m:t>
-                          </m:r>
-                        </m:sub>
-                      </m:sSub>
-                      <m:r>
-                        <a:rPr lang="en-US" sz="2800" b="0" i="1" smtClean="0">
-                          <a:latin typeface="Cambria Math" panose="02040503050406030204" pitchFamily="18" charset="0"/>
-                          <a:ea typeface="Cambria Math" panose="02040503050406030204" pitchFamily="18" charset="0"/>
-                        </a:rPr>
-                        <m:t>+</m:t>
-                      </m:r>
-                      <m:r>
-                        <a:rPr lang="en-US" sz="2800" b="1" i="0" smtClean="0">
-                          <a:latin typeface="Cambria Math" panose="02040503050406030204" pitchFamily="18" charset="0"/>
-                          <a:ea typeface="Cambria Math" panose="02040503050406030204" pitchFamily="18" charset="0"/>
-                        </a:rPr>
-                        <m:t>𝛆</m:t>
-                      </m:r>
-                      <m:sSub>
-                        <m:sSubPr>
-                          <m:ctrlPr>
-                            <a:rPr lang="en-US" sz="2800" b="0" i="1" smtClean="0">
-                              <a:latin typeface="Cambria Math" panose="02040503050406030204" pitchFamily="18" charset="0"/>
-                              <a:ea typeface="Cambria Math" panose="02040503050406030204" pitchFamily="18" charset="0"/>
-                            </a:rPr>
-                          </m:ctrlPr>
-                        </m:sSubPr>
-                        <m:e>
-                          <m:r>
-                            <a:rPr lang="en-US" sz="2800" b="1" i="0" smtClean="0">
-                              <a:latin typeface="Cambria Math" panose="02040503050406030204" pitchFamily="18" charset="0"/>
-                              <a:ea typeface="Cambria Math" panose="02040503050406030204" pitchFamily="18" charset="0"/>
-                            </a:rPr>
-                            <m:t>𝐳</m:t>
-                          </m:r>
-                        </m:e>
-                        <m:sub>
-                          <m:r>
-                            <a:rPr lang="en-US" sz="2800" b="0" i="1" smtClean="0">
-                              <a:latin typeface="Cambria Math" panose="02040503050406030204" pitchFamily="18" charset="0"/>
-                              <a:ea typeface="Cambria Math" panose="02040503050406030204" pitchFamily="18" charset="0"/>
-                            </a:rPr>
-                            <m:t>𝑖</m:t>
-                          </m:r>
-                        </m:sub>
-                      </m:sSub>
-                      <m:r>
-                        <a:rPr lang="en-US" sz="2800" b="0" i="1" smtClean="0">
-                          <a:latin typeface="Cambria Math" panose="02040503050406030204" pitchFamily="18" charset="0"/>
-                          <a:ea typeface="Cambria Math" panose="02040503050406030204" pitchFamily="18" charset="0"/>
-                        </a:rPr>
-                        <m:t>)</m:t>
-                      </m:r>
-                    </m:oMath>
-                  </m:oMathPara>
-                </a14:m>
-                <a:endParaRPr lang="en-US" sz="2800" dirty="0" smtClean="0">
-                  <a:solidFill>
-                    <a:schemeClr val="tx1"/>
-                  </a:solidFill>
-                </a:endParaRPr>
-              </a:p>
-              <a:p>
-                <a:pPr marL="971550" lvl="1" indent="-514350">
-                  <a:buFont typeface="+mj-lt"/>
-                  <a:buAutoNum type="arabicPeriod"/>
-                </a:pPr>
-                <a:r>
-                  <a:rPr lang="en-US" sz="3200" dirty="0" smtClean="0">
-                    <a:solidFill>
-                      <a:schemeClr val="tx1"/>
-                    </a:solidFill>
-                  </a:rPr>
-                  <a:t>Specify distribution for random effects</a:t>
-                </a:r>
-              </a:p>
-              <a:p>
-                <a:pPr marL="914400" lvl="2" indent="0">
-                  <a:buNone/>
-                </a:pPr>
-                <a14:m>
-                  <m:oMathPara xmlns:m="http://schemas.openxmlformats.org/officeDocument/2006/math">
-                    <m:oMathParaPr>
-                      <m:jc m:val="centerGroup"/>
-                    </m:oMathParaPr>
-                    <m:oMath xmlns:m="http://schemas.openxmlformats.org/officeDocument/2006/math">
-                      <m:sSub>
-                        <m:sSubPr>
-                          <m:ctrlPr>
-                            <a:rPr lang="en-US" sz="2800" b="0" i="1" smtClean="0">
-                              <a:solidFill>
-                                <a:schemeClr val="tx1"/>
-                              </a:solidFill>
-                              <a:latin typeface="Cambria Math" panose="02040503050406030204" pitchFamily="18" charset="0"/>
-                            </a:rPr>
-                          </m:ctrlPr>
-                        </m:sSubPr>
-                        <m:e>
-                          <m:r>
-                            <a:rPr lang="en-US" sz="2800" b="0" i="1" smtClean="0">
-                              <a:solidFill>
-                                <a:schemeClr val="tx1"/>
-                              </a:solidFill>
-                              <a:latin typeface="Cambria Math" panose="02040503050406030204" pitchFamily="18" charset="0"/>
-                              <a:ea typeface="Cambria Math" panose="02040503050406030204" pitchFamily="18" charset="0"/>
-                            </a:rPr>
-                            <m:t>𝜀</m:t>
-                          </m:r>
-                        </m:e>
-                        <m:sub>
-                          <m:r>
-                            <a:rPr lang="en-US" sz="2800" b="0" i="1" smtClean="0">
-                              <a:solidFill>
-                                <a:schemeClr val="tx1"/>
-                              </a:solidFill>
-                              <a:latin typeface="Cambria Math" panose="02040503050406030204" pitchFamily="18" charset="0"/>
-                            </a:rPr>
-                            <m:t>𝑖</m:t>
-                          </m:r>
-                        </m:sub>
-                      </m:sSub>
-                      <m:r>
-                        <a:rPr lang="en-US" sz="2800" b="0" i="1" smtClean="0">
-                          <a:solidFill>
-                            <a:schemeClr val="tx1"/>
-                          </a:solidFill>
-                          <a:latin typeface="Cambria Math" panose="02040503050406030204" pitchFamily="18" charset="0"/>
-                        </a:rPr>
-                        <m:t>~</m:t>
-                      </m:r>
-                      <m:r>
-                        <a:rPr lang="en-US" sz="2800" b="0" i="1" smtClean="0">
-                          <a:solidFill>
-                            <a:schemeClr val="tx1"/>
-                          </a:solidFill>
-                          <a:latin typeface="Cambria Math" panose="02040503050406030204" pitchFamily="18" charset="0"/>
-                        </a:rPr>
-                        <m:t>𝑁𝑜𝑟𝑚𝑎𝑙</m:t>
-                      </m:r>
-                      <m:r>
-                        <a:rPr lang="en-US" sz="2800" b="0" i="1" smtClean="0">
-                          <a:solidFill>
-                            <a:schemeClr val="tx1"/>
-                          </a:solidFill>
-                          <a:latin typeface="Cambria Math" panose="02040503050406030204" pitchFamily="18" charset="0"/>
-                        </a:rPr>
-                        <m:t>(0,</m:t>
-                      </m:r>
-                      <m:sSubSup>
-                        <m:sSubSupPr>
-                          <m:ctrlPr>
-                            <a:rPr lang="en-US" sz="2800" b="0" i="1" smtClean="0">
-                              <a:solidFill>
-                                <a:schemeClr val="tx1"/>
-                              </a:solidFill>
-                              <a:latin typeface="Cambria Math" panose="02040503050406030204" pitchFamily="18" charset="0"/>
-                              <a:ea typeface="Cambria Math" panose="02040503050406030204" pitchFamily="18" charset="0"/>
-                            </a:rPr>
-                          </m:ctrlPr>
-                        </m:sSubSupPr>
-                        <m:e>
-                          <m:r>
-                            <a:rPr lang="en-US" sz="2800" b="0" i="1" smtClean="0">
-                              <a:solidFill>
-                                <a:schemeClr val="tx1"/>
-                              </a:solidFill>
-                              <a:latin typeface="Cambria Math" panose="02040503050406030204" pitchFamily="18" charset="0"/>
-                              <a:ea typeface="Cambria Math" panose="02040503050406030204" pitchFamily="18" charset="0"/>
-                            </a:rPr>
-                            <m:t>𝜎</m:t>
-                          </m:r>
-                        </m:e>
-                        <m:sub>
-                          <m:r>
-                            <a:rPr lang="en-US" sz="2800" b="0" i="1" smtClean="0">
-                              <a:solidFill>
-                                <a:schemeClr val="tx1"/>
-                              </a:solidFill>
-                              <a:latin typeface="Cambria Math" panose="02040503050406030204" pitchFamily="18" charset="0"/>
-                              <a:ea typeface="Cambria Math" panose="02040503050406030204" pitchFamily="18" charset="0"/>
-                            </a:rPr>
-                            <m:t>𝑢</m:t>
-                          </m:r>
-                        </m:sub>
-                        <m:sup>
-                          <m:r>
-                            <a:rPr lang="en-US" sz="2800" b="0" i="1" smtClean="0">
-                              <a:solidFill>
-                                <a:schemeClr val="tx1"/>
-                              </a:solidFill>
-                              <a:latin typeface="Cambria Math" panose="02040503050406030204" pitchFamily="18" charset="0"/>
-                              <a:ea typeface="Cambria Math" panose="02040503050406030204" pitchFamily="18" charset="0"/>
-                            </a:rPr>
-                            <m:t>2</m:t>
-                          </m:r>
-                        </m:sup>
-                      </m:sSubSup>
-                      <m:r>
-                        <a:rPr lang="en-US" sz="2800" b="0" i="1" smtClean="0">
-                          <a:solidFill>
-                            <a:schemeClr val="tx1"/>
-                          </a:solidFill>
-                          <a:latin typeface="Cambria Math" panose="02040503050406030204" pitchFamily="18" charset="0"/>
-                          <a:ea typeface="Cambria Math" panose="02040503050406030204" pitchFamily="18" charset="0"/>
-                        </a:rPr>
-                        <m:t>)</m:t>
-                      </m:r>
-                    </m:oMath>
-                  </m:oMathPara>
-                </a14:m>
-                <a:endParaRPr lang="en-US" sz="2800" baseline="30000" dirty="0">
-                  <a:solidFill>
-                    <a:schemeClr val="tx1"/>
-                  </a:solidFill>
-                </a:endParaRPr>
-              </a:p>
-              <a:p>
-                <a:pPr marL="571500" indent="-514350"/>
-                <a:endParaRPr lang="en-US" sz="3600" dirty="0" smtClean="0"/>
-              </a:p>
-              <a:p>
-                <a:pPr marL="57150" indent="0">
-                  <a:buNone/>
-                </a:pPr>
-                <a:r>
-                  <a:rPr lang="en-US" sz="3600" dirty="0" smtClean="0"/>
-                  <a:t>=	General linear model + mixed effect(s)</a:t>
-                </a:r>
-              </a:p>
-            </p:txBody>
-          </p:sp>
-        </mc:Choice>
-        <mc:Fallback xmlns="">
-          <p:sp>
-            <p:nvSpPr>
-              <p:cNvPr id="3" name="Content Placeholder 2"/>
-              <p:cNvSpPr>
-                <a:spLocks noGrp="1" noRot="1" noChangeAspect="1" noMove="1" noResize="1" noEditPoints="1" noAdjustHandles="1" noChangeArrowheads="1" noChangeShapeType="1" noTextEdit="1"/>
-              </p:cNvSpPr>
-              <p:nvPr>
-                <p:ph idx="1"/>
-              </p:nvPr>
-            </p:nvSpPr>
-            <p:spPr>
-              <a:blipFill>
-                <a:blip r:embed="rId2"/>
-                <a:stretch>
-                  <a:fillRect l="-2102" t="-1641"/>
-                </a:stretch>
-              </a:blipFill>
-            </p:spPr>
-            <p:txBody>
-              <a:bodyPr/>
-              <a:lstStyle/>
-              <a:p>
-                <a:r>
-                  <a:rPr lang="en-GB">
-                    <a:noFill/>
-                  </a:rPr>
-                  <a:t> </a:t>
-                </a:r>
-              </a:p>
-            </p:txBody>
-          </p:sp>
-        </mc:Fallback>
-      </mc:AlternateContent>
-    </p:spTree>
-    <p:extLst>
-      <p:ext uri="{BB962C8B-B14F-4D97-AF65-F5344CB8AC3E}">
-        <p14:creationId xmlns:p14="http://schemas.microsoft.com/office/powerpoint/2010/main" val="3798116001"/>
       </p:ext>
     </p:extLst>
   </p:cSld>
@@ -12768,6 +13413,641 @@
                   <a:buNone/>
                 </a:pPr>
                 <a:r>
+                  <a:rPr lang="en-US" sz="3600" dirty="0" smtClean="0"/>
+                  <a:t>Generalized linear mixed model</a:t>
+                </a:r>
+              </a:p>
+              <a:p>
+                <a:pPr marL="971550" lvl="1" indent="-514350">
+                  <a:buFont typeface="+mj-lt"/>
+                  <a:buAutoNum type="arabicPeriod"/>
+                </a:pPr>
+                <a:r>
+                  <a:rPr lang="en-US" sz="3200" dirty="0" smtClean="0">
+                    <a:solidFill>
+                      <a:schemeClr val="tx1"/>
+                    </a:solidFill>
+                  </a:rPr>
+                  <a:t>Specify distribution for response variable</a:t>
+                </a:r>
+              </a:p>
+              <a:p>
+                <a:pPr marL="914400" lvl="2" indent="0">
+                  <a:buNone/>
+                </a:pPr>
+                <a14:m>
+                  <m:oMathPara xmlns:m="http://schemas.openxmlformats.org/officeDocument/2006/math">
+                    <m:oMathParaPr>
+                      <m:jc m:val="centerGroup"/>
+                    </m:oMathParaPr>
+                    <m:oMath xmlns:m="http://schemas.openxmlformats.org/officeDocument/2006/math">
+                      <m:sSub>
+                        <m:sSubPr>
+                          <m:ctrlPr>
+                            <a:rPr lang="en-US" sz="2800" b="0" i="1" smtClean="0">
+                              <a:solidFill>
+                                <a:schemeClr val="tx1"/>
+                              </a:solidFill>
+                              <a:latin typeface="Cambria Math" panose="02040503050406030204" pitchFamily="18" charset="0"/>
+                            </a:rPr>
+                          </m:ctrlPr>
+                        </m:sSubPr>
+                        <m:e>
+                          <m:r>
+                            <a:rPr lang="en-US" sz="2800" b="0" i="1" smtClean="0">
+                              <a:solidFill>
+                                <a:schemeClr val="tx1"/>
+                              </a:solidFill>
+                              <a:latin typeface="Cambria Math" panose="02040503050406030204" pitchFamily="18" charset="0"/>
+                            </a:rPr>
+                            <m:t>𝑐</m:t>
+                          </m:r>
+                        </m:e>
+                        <m:sub>
+                          <m:r>
+                            <a:rPr lang="en-US" sz="2800" b="0" i="1" smtClean="0">
+                              <a:solidFill>
+                                <a:schemeClr val="tx1"/>
+                              </a:solidFill>
+                              <a:latin typeface="Cambria Math" panose="02040503050406030204" pitchFamily="18" charset="0"/>
+                            </a:rPr>
+                            <m:t>𝑖</m:t>
+                          </m:r>
+                        </m:sub>
+                      </m:sSub>
+                      <m:r>
+                        <a:rPr lang="en-US" sz="2800" b="0" i="1" smtClean="0">
+                          <a:solidFill>
+                            <a:schemeClr val="tx1"/>
+                          </a:solidFill>
+                          <a:latin typeface="Cambria Math" panose="02040503050406030204" pitchFamily="18" charset="0"/>
+                        </a:rPr>
+                        <m:t>~</m:t>
+                      </m:r>
+                      <m:r>
+                        <m:rPr>
+                          <m:sty m:val="p"/>
+                        </m:rPr>
+                        <a:rPr lang="en-US" sz="2800" b="0" i="0" smtClean="0">
+                          <a:solidFill>
+                            <a:schemeClr val="tx1"/>
+                          </a:solidFill>
+                          <a:latin typeface="Cambria Math" panose="02040503050406030204" pitchFamily="18" charset="0"/>
+                        </a:rPr>
+                        <m:t>Poisson</m:t>
+                      </m:r>
+                      <m:r>
+                        <a:rPr lang="en-US" sz="2800" b="0" i="1" smtClean="0">
+                          <a:solidFill>
+                            <a:schemeClr val="tx1"/>
+                          </a:solidFill>
+                          <a:latin typeface="Cambria Math" panose="02040503050406030204" pitchFamily="18" charset="0"/>
+                        </a:rPr>
+                        <m:t>(</m:t>
+                      </m:r>
+                      <m:sSub>
+                        <m:sSubPr>
+                          <m:ctrlPr>
+                            <a:rPr lang="en-US" sz="2800" b="0" i="1" smtClean="0">
+                              <a:solidFill>
+                                <a:schemeClr val="tx1"/>
+                              </a:solidFill>
+                              <a:latin typeface="Cambria Math" panose="02040503050406030204" pitchFamily="18" charset="0"/>
+                              <a:ea typeface="Cambria Math" panose="02040503050406030204" pitchFamily="18" charset="0"/>
+                            </a:rPr>
+                          </m:ctrlPr>
+                        </m:sSubPr>
+                        <m:e>
+                          <m:r>
+                            <a:rPr lang="en-US" sz="2800" b="0" i="1" smtClean="0">
+                              <a:solidFill>
+                                <a:schemeClr val="tx1"/>
+                              </a:solidFill>
+                              <a:latin typeface="Cambria Math" panose="02040503050406030204" pitchFamily="18" charset="0"/>
+                              <a:ea typeface="Cambria Math" panose="02040503050406030204" pitchFamily="18" charset="0"/>
+                            </a:rPr>
+                            <m:t>𝜆</m:t>
+                          </m:r>
+                        </m:e>
+                        <m:sub>
+                          <m:r>
+                            <a:rPr lang="en-US" sz="2800" b="0" i="1" smtClean="0">
+                              <a:solidFill>
+                                <a:schemeClr val="tx1"/>
+                              </a:solidFill>
+                              <a:latin typeface="Cambria Math" panose="02040503050406030204" pitchFamily="18" charset="0"/>
+                              <a:ea typeface="Cambria Math" panose="02040503050406030204" pitchFamily="18" charset="0"/>
+                            </a:rPr>
+                            <m:t>𝑖</m:t>
+                          </m:r>
+                        </m:sub>
+                      </m:sSub>
+                      <m:r>
+                        <a:rPr lang="en-US" sz="2800" b="0" i="1" smtClean="0">
+                          <a:solidFill>
+                            <a:schemeClr val="tx1"/>
+                          </a:solidFill>
+                          <a:latin typeface="Cambria Math" panose="02040503050406030204" pitchFamily="18" charset="0"/>
+                          <a:ea typeface="Cambria Math" panose="02040503050406030204" pitchFamily="18" charset="0"/>
+                        </a:rPr>
+                        <m:t>)</m:t>
+                      </m:r>
+                    </m:oMath>
+                  </m:oMathPara>
+                </a14:m>
+                <a:endParaRPr lang="en-US" sz="2800" dirty="0">
+                  <a:solidFill>
+                    <a:schemeClr val="tx1"/>
+                  </a:solidFill>
+                </a:endParaRPr>
+              </a:p>
+              <a:p>
+                <a:pPr marL="971550" lvl="1" indent="-514350">
+                  <a:buFont typeface="+mj-lt"/>
+                  <a:buAutoNum type="arabicPeriod"/>
+                </a:pPr>
+                <a:r>
+                  <a:rPr lang="en-US" sz="3200" dirty="0">
+                    <a:solidFill>
+                      <a:schemeClr val="tx1"/>
+                    </a:solidFill>
+                  </a:rPr>
+                  <a:t>Specify function for expected value</a:t>
+                </a:r>
+              </a:p>
+              <a:p>
+                <a:pPr marL="914400" lvl="2" indent="0">
+                  <a:buNone/>
+                </a:pPr>
+                <a14:m>
+                  <m:oMathPara xmlns:m="http://schemas.openxmlformats.org/officeDocument/2006/math">
+                    <m:oMathParaPr>
+                      <m:jc m:val="centerGroup"/>
+                    </m:oMathParaPr>
+                    <m:oMath xmlns:m="http://schemas.openxmlformats.org/officeDocument/2006/math">
+                      <m:sSub>
+                        <m:sSubPr>
+                          <m:ctrlPr>
+                            <a:rPr lang="en-US" sz="2800" i="1">
+                              <a:latin typeface="Cambria Math" panose="02040503050406030204" pitchFamily="18" charset="0"/>
+                              <a:ea typeface="Cambria Math" panose="02040503050406030204" pitchFamily="18" charset="0"/>
+                            </a:rPr>
+                          </m:ctrlPr>
+                        </m:sSubPr>
+                        <m:e>
+                          <m:r>
+                            <a:rPr lang="en-US" sz="2800" i="1">
+                              <a:latin typeface="Cambria Math" panose="02040503050406030204" pitchFamily="18" charset="0"/>
+                              <a:ea typeface="Cambria Math" panose="02040503050406030204" pitchFamily="18" charset="0"/>
+                            </a:rPr>
+                            <m:t>𝜆</m:t>
+                          </m:r>
+                        </m:e>
+                        <m:sub>
+                          <m:r>
+                            <a:rPr lang="en-US" sz="2800" i="1">
+                              <a:latin typeface="Cambria Math" panose="02040503050406030204" pitchFamily="18" charset="0"/>
+                              <a:ea typeface="Cambria Math" panose="02040503050406030204" pitchFamily="18" charset="0"/>
+                            </a:rPr>
+                            <m:t>𝑖</m:t>
+                          </m:r>
+                        </m:sub>
+                      </m:sSub>
+                      <m:r>
+                        <a:rPr lang="en-US" sz="2800" b="0" i="1" smtClean="0">
+                          <a:latin typeface="Cambria Math" panose="02040503050406030204" pitchFamily="18" charset="0"/>
+                          <a:ea typeface="Cambria Math" panose="02040503050406030204" pitchFamily="18" charset="0"/>
+                        </a:rPr>
+                        <m:t>=</m:t>
+                      </m:r>
+                      <m:r>
+                        <m:rPr>
+                          <m:sty m:val="p"/>
+                        </m:rPr>
+                        <a:rPr lang="en-US" sz="2800" b="0" i="0" smtClean="0">
+                          <a:latin typeface="Cambria Math" panose="02040503050406030204" pitchFamily="18" charset="0"/>
+                          <a:ea typeface="Cambria Math" panose="02040503050406030204" pitchFamily="18" charset="0"/>
+                        </a:rPr>
+                        <m:t>exp</m:t>
+                      </m:r>
+                      <m:r>
+                        <a:rPr lang="en-US" sz="2800" b="0" i="1" smtClean="0">
+                          <a:latin typeface="Cambria Math" panose="02040503050406030204" pitchFamily="18" charset="0"/>
+                          <a:ea typeface="Cambria Math" panose="02040503050406030204" pitchFamily="18" charset="0"/>
+                        </a:rPr>
+                        <m:t>⁡(</m:t>
+                      </m:r>
+                      <m:sSub>
+                        <m:sSubPr>
+                          <m:ctrlPr>
+                            <a:rPr lang="en-US" sz="2800" b="0" i="1" smtClean="0">
+                              <a:latin typeface="Cambria Math" panose="02040503050406030204" pitchFamily="18" charset="0"/>
+                              <a:ea typeface="Cambria Math" panose="02040503050406030204" pitchFamily="18" charset="0"/>
+                            </a:rPr>
+                          </m:ctrlPr>
+                        </m:sSubPr>
+                        <m:e>
+                          <m:r>
+                            <a:rPr lang="en-US" sz="2800" b="0" i="1" smtClean="0">
+                              <a:latin typeface="Cambria Math" panose="02040503050406030204" pitchFamily="18" charset="0"/>
+                              <a:ea typeface="Cambria Math" panose="02040503050406030204" pitchFamily="18" charset="0"/>
+                            </a:rPr>
+                            <m:t>𝛽</m:t>
+                          </m:r>
+                        </m:e>
+                        <m:sub>
+                          <m:r>
+                            <a:rPr lang="en-US" sz="2800" b="0" i="1" smtClean="0">
+                              <a:latin typeface="Cambria Math" panose="02040503050406030204" pitchFamily="18" charset="0"/>
+                              <a:ea typeface="Cambria Math" panose="02040503050406030204" pitchFamily="18" charset="0"/>
+                            </a:rPr>
+                            <m:t>0</m:t>
+                          </m:r>
+                        </m:sub>
+                      </m:sSub>
+                      <m:r>
+                        <a:rPr lang="en-US" sz="2800" b="0" i="1" smtClean="0">
+                          <a:latin typeface="Cambria Math" panose="02040503050406030204" pitchFamily="18" charset="0"/>
+                          <a:ea typeface="Cambria Math" panose="02040503050406030204" pitchFamily="18" charset="0"/>
+                        </a:rPr>
+                        <m:t>+</m:t>
+                      </m:r>
+                      <m:r>
+                        <a:rPr lang="en-US" sz="2800" b="1" i="0" smtClean="0">
+                          <a:latin typeface="Cambria Math" panose="02040503050406030204" pitchFamily="18" charset="0"/>
+                          <a:ea typeface="Cambria Math" panose="02040503050406030204" pitchFamily="18" charset="0"/>
+                        </a:rPr>
+                        <m:t>𝛃</m:t>
+                      </m:r>
+                      <m:sSub>
+                        <m:sSubPr>
+                          <m:ctrlPr>
+                            <a:rPr lang="en-US" sz="2800" b="0" i="1" smtClean="0">
+                              <a:latin typeface="Cambria Math" panose="02040503050406030204" pitchFamily="18" charset="0"/>
+                              <a:ea typeface="Cambria Math" panose="02040503050406030204" pitchFamily="18" charset="0"/>
+                            </a:rPr>
+                          </m:ctrlPr>
+                        </m:sSubPr>
+                        <m:e>
+                          <m:r>
+                            <a:rPr lang="en-US" sz="2800" b="1" i="0" smtClean="0">
+                              <a:latin typeface="Cambria Math" panose="02040503050406030204" pitchFamily="18" charset="0"/>
+                              <a:ea typeface="Cambria Math" panose="02040503050406030204" pitchFamily="18" charset="0"/>
+                            </a:rPr>
+                            <m:t>𝐱</m:t>
+                          </m:r>
+                        </m:e>
+                        <m:sub>
+                          <m:r>
+                            <a:rPr lang="en-US" sz="2800" b="0" i="1" smtClean="0">
+                              <a:latin typeface="Cambria Math" panose="02040503050406030204" pitchFamily="18" charset="0"/>
+                              <a:ea typeface="Cambria Math" panose="02040503050406030204" pitchFamily="18" charset="0"/>
+                            </a:rPr>
+                            <m:t>𝑖</m:t>
+                          </m:r>
+                        </m:sub>
+                      </m:sSub>
+                      <m:r>
+                        <a:rPr lang="en-US" sz="2800" b="0" i="1" smtClean="0">
+                          <a:latin typeface="Cambria Math" panose="02040503050406030204" pitchFamily="18" charset="0"/>
+                          <a:ea typeface="Cambria Math" panose="02040503050406030204" pitchFamily="18" charset="0"/>
+                        </a:rPr>
+                        <m:t>+</m:t>
+                      </m:r>
+                      <m:r>
+                        <a:rPr lang="en-US" sz="2800" b="1" i="0" smtClean="0">
+                          <a:latin typeface="Cambria Math" panose="02040503050406030204" pitchFamily="18" charset="0"/>
+                          <a:ea typeface="Cambria Math" panose="02040503050406030204" pitchFamily="18" charset="0"/>
+                        </a:rPr>
+                        <m:t>𝛆</m:t>
+                      </m:r>
+                      <m:sSub>
+                        <m:sSubPr>
+                          <m:ctrlPr>
+                            <a:rPr lang="en-US" sz="2800" b="0" i="1" smtClean="0">
+                              <a:latin typeface="Cambria Math" panose="02040503050406030204" pitchFamily="18" charset="0"/>
+                              <a:ea typeface="Cambria Math" panose="02040503050406030204" pitchFamily="18" charset="0"/>
+                            </a:rPr>
+                          </m:ctrlPr>
+                        </m:sSubPr>
+                        <m:e>
+                          <m:r>
+                            <a:rPr lang="en-US" sz="2800" b="1" i="0" smtClean="0">
+                              <a:latin typeface="Cambria Math" panose="02040503050406030204" pitchFamily="18" charset="0"/>
+                              <a:ea typeface="Cambria Math" panose="02040503050406030204" pitchFamily="18" charset="0"/>
+                            </a:rPr>
+                            <m:t>𝐳</m:t>
+                          </m:r>
+                        </m:e>
+                        <m:sub>
+                          <m:r>
+                            <a:rPr lang="en-US" sz="2800" b="0" i="1" smtClean="0">
+                              <a:latin typeface="Cambria Math" panose="02040503050406030204" pitchFamily="18" charset="0"/>
+                              <a:ea typeface="Cambria Math" panose="02040503050406030204" pitchFamily="18" charset="0"/>
+                            </a:rPr>
+                            <m:t>𝑖</m:t>
+                          </m:r>
+                        </m:sub>
+                      </m:sSub>
+                      <m:r>
+                        <a:rPr lang="en-US" sz="2800" b="0" i="1" smtClean="0">
+                          <a:latin typeface="Cambria Math" panose="02040503050406030204" pitchFamily="18" charset="0"/>
+                          <a:ea typeface="Cambria Math" panose="02040503050406030204" pitchFamily="18" charset="0"/>
+                        </a:rPr>
+                        <m:t>)</m:t>
+                      </m:r>
+                    </m:oMath>
+                  </m:oMathPara>
+                </a14:m>
+                <a:endParaRPr lang="en-US" sz="2800" dirty="0" smtClean="0">
+                  <a:solidFill>
+                    <a:schemeClr val="tx1"/>
+                  </a:solidFill>
+                </a:endParaRPr>
+              </a:p>
+              <a:p>
+                <a:pPr marL="971550" lvl="1" indent="-514350">
+                  <a:buFont typeface="+mj-lt"/>
+                  <a:buAutoNum type="arabicPeriod"/>
+                </a:pPr>
+                <a:r>
+                  <a:rPr lang="en-US" sz="3200" dirty="0" smtClean="0">
+                    <a:solidFill>
+                      <a:schemeClr val="tx1"/>
+                    </a:solidFill>
+                  </a:rPr>
+                  <a:t>Specify distribution for random effects</a:t>
+                </a:r>
+              </a:p>
+              <a:p>
+                <a:pPr marL="914400" lvl="2" indent="0">
+                  <a:buNone/>
+                </a:pPr>
+                <a14:m>
+                  <m:oMathPara xmlns:m="http://schemas.openxmlformats.org/officeDocument/2006/math">
+                    <m:oMathParaPr>
+                      <m:jc m:val="centerGroup"/>
+                    </m:oMathParaPr>
+                    <m:oMath xmlns:m="http://schemas.openxmlformats.org/officeDocument/2006/math">
+                      <m:sSub>
+                        <m:sSubPr>
+                          <m:ctrlPr>
+                            <a:rPr lang="en-US" sz="2800" b="0" i="1" smtClean="0">
+                              <a:solidFill>
+                                <a:schemeClr val="tx1"/>
+                              </a:solidFill>
+                              <a:latin typeface="Cambria Math" panose="02040503050406030204" pitchFamily="18" charset="0"/>
+                            </a:rPr>
+                          </m:ctrlPr>
+                        </m:sSubPr>
+                        <m:e>
+                          <m:r>
+                            <a:rPr lang="en-US" sz="2800" b="0" i="1" smtClean="0">
+                              <a:solidFill>
+                                <a:schemeClr val="tx1"/>
+                              </a:solidFill>
+                              <a:latin typeface="Cambria Math" panose="02040503050406030204" pitchFamily="18" charset="0"/>
+                              <a:ea typeface="Cambria Math" panose="02040503050406030204" pitchFamily="18" charset="0"/>
+                            </a:rPr>
+                            <m:t>𝜀</m:t>
+                          </m:r>
+                        </m:e>
+                        <m:sub>
+                          <m:r>
+                            <a:rPr lang="en-US" sz="2800" b="0" i="1" smtClean="0">
+                              <a:solidFill>
+                                <a:schemeClr val="tx1"/>
+                              </a:solidFill>
+                              <a:latin typeface="Cambria Math" panose="02040503050406030204" pitchFamily="18" charset="0"/>
+                            </a:rPr>
+                            <m:t>𝑖</m:t>
+                          </m:r>
+                        </m:sub>
+                      </m:sSub>
+                      <m:r>
+                        <a:rPr lang="en-US" sz="2800" b="0" i="1" smtClean="0">
+                          <a:solidFill>
+                            <a:schemeClr val="tx1"/>
+                          </a:solidFill>
+                          <a:latin typeface="Cambria Math" panose="02040503050406030204" pitchFamily="18" charset="0"/>
+                        </a:rPr>
+                        <m:t>~</m:t>
+                      </m:r>
+                      <m:r>
+                        <a:rPr lang="en-US" sz="2800" b="0" i="1" smtClean="0">
+                          <a:solidFill>
+                            <a:schemeClr val="tx1"/>
+                          </a:solidFill>
+                          <a:latin typeface="Cambria Math" panose="02040503050406030204" pitchFamily="18" charset="0"/>
+                        </a:rPr>
+                        <m:t>𝑁𝑜𝑟𝑚𝑎𝑙</m:t>
+                      </m:r>
+                      <m:r>
+                        <a:rPr lang="en-US" sz="2800" b="0" i="1" smtClean="0">
+                          <a:solidFill>
+                            <a:schemeClr val="tx1"/>
+                          </a:solidFill>
+                          <a:latin typeface="Cambria Math" panose="02040503050406030204" pitchFamily="18" charset="0"/>
+                        </a:rPr>
+                        <m:t>(0,</m:t>
+                      </m:r>
+                      <m:sSubSup>
+                        <m:sSubSupPr>
+                          <m:ctrlPr>
+                            <a:rPr lang="en-US" sz="2800" b="0" i="1" smtClean="0">
+                              <a:solidFill>
+                                <a:schemeClr val="tx1"/>
+                              </a:solidFill>
+                              <a:latin typeface="Cambria Math" panose="02040503050406030204" pitchFamily="18" charset="0"/>
+                              <a:ea typeface="Cambria Math" panose="02040503050406030204" pitchFamily="18" charset="0"/>
+                            </a:rPr>
+                          </m:ctrlPr>
+                        </m:sSubSupPr>
+                        <m:e>
+                          <m:r>
+                            <a:rPr lang="en-US" sz="2800" b="0" i="1" smtClean="0">
+                              <a:solidFill>
+                                <a:schemeClr val="tx1"/>
+                              </a:solidFill>
+                              <a:latin typeface="Cambria Math" panose="02040503050406030204" pitchFamily="18" charset="0"/>
+                              <a:ea typeface="Cambria Math" panose="02040503050406030204" pitchFamily="18" charset="0"/>
+                            </a:rPr>
+                            <m:t>𝜎</m:t>
+                          </m:r>
+                        </m:e>
+                        <m:sub>
+                          <m:r>
+                            <a:rPr lang="en-US" sz="2800" b="0" i="1" smtClean="0">
+                              <a:solidFill>
+                                <a:schemeClr val="tx1"/>
+                              </a:solidFill>
+                              <a:latin typeface="Cambria Math" panose="02040503050406030204" pitchFamily="18" charset="0"/>
+                              <a:ea typeface="Cambria Math" panose="02040503050406030204" pitchFamily="18" charset="0"/>
+                            </a:rPr>
+                            <m:t>𝑢</m:t>
+                          </m:r>
+                        </m:sub>
+                        <m:sup>
+                          <m:r>
+                            <a:rPr lang="en-US" sz="2800" b="0" i="1" smtClean="0">
+                              <a:solidFill>
+                                <a:schemeClr val="tx1"/>
+                              </a:solidFill>
+                              <a:latin typeface="Cambria Math" panose="02040503050406030204" pitchFamily="18" charset="0"/>
+                              <a:ea typeface="Cambria Math" panose="02040503050406030204" pitchFamily="18" charset="0"/>
+                            </a:rPr>
+                            <m:t>2</m:t>
+                          </m:r>
+                        </m:sup>
+                      </m:sSubSup>
+                      <m:r>
+                        <a:rPr lang="en-US" sz="2800" b="0" i="1" smtClean="0">
+                          <a:solidFill>
+                            <a:schemeClr val="tx1"/>
+                          </a:solidFill>
+                          <a:latin typeface="Cambria Math" panose="02040503050406030204" pitchFamily="18" charset="0"/>
+                          <a:ea typeface="Cambria Math" panose="02040503050406030204" pitchFamily="18" charset="0"/>
+                        </a:rPr>
+                        <m:t>)</m:t>
+                      </m:r>
+                    </m:oMath>
+                  </m:oMathPara>
+                </a14:m>
+                <a:endParaRPr lang="en-US" sz="2800" baseline="30000" dirty="0">
+                  <a:solidFill>
+                    <a:schemeClr val="tx1"/>
+                  </a:solidFill>
+                </a:endParaRPr>
+              </a:p>
+              <a:p>
+                <a:pPr marL="571500" indent="-514350"/>
+                <a:endParaRPr lang="en-US" sz="3600" dirty="0" smtClean="0"/>
+              </a:p>
+              <a:p>
+                <a:pPr marL="57150" indent="0">
+                  <a:buNone/>
+                </a:pPr>
+                <a:r>
+                  <a:rPr lang="en-US" sz="3600" dirty="0" smtClean="0"/>
+                  <a:t>=	General linear model + mixed effect(s)</a:t>
+                </a:r>
+              </a:p>
+            </p:txBody>
+          </p:sp>
+        </mc:Choice>
+        <mc:Fallback xmlns="">
+          <p:sp>
+            <p:nvSpPr>
+              <p:cNvPr id="3" name="Content Placeholder 2"/>
+              <p:cNvSpPr>
+                <a:spLocks noGrp="1" noRot="1" noChangeAspect="1" noMove="1" noResize="1" noEditPoints="1" noAdjustHandles="1" noChangeArrowheads="1" noChangeShapeType="1" noTextEdit="1"/>
+              </p:cNvSpPr>
+              <p:nvPr>
+                <p:ph idx="1"/>
+              </p:nvPr>
+            </p:nvSpPr>
+            <p:spPr>
+              <a:blipFill>
+                <a:blip r:embed="rId2"/>
+                <a:stretch>
+                  <a:fillRect l="-2102" t="-1641"/>
+                </a:stretch>
+              </a:blipFill>
+            </p:spPr>
+            <p:txBody>
+              <a:bodyPr/>
+              <a:lstStyle/>
+              <a:p>
+                <a:r>
+                  <a:rPr lang="en-GB">
+                    <a:noFill/>
+                  </a:rPr>
+                  <a:t> </a:t>
+                </a:r>
+              </a:p>
+            </p:txBody>
+          </p:sp>
+        </mc:Fallback>
+      </mc:AlternateContent>
+    </p:spTree>
+    <p:extLst>
+      <p:ext uri="{BB962C8B-B14F-4D97-AF65-F5344CB8AC3E}">
+        <p14:creationId xmlns:p14="http://schemas.microsoft.com/office/powerpoint/2010/main" val="3798116001"/>
+      </p:ext>
+    </p:extLst>
+  </p:cSld>
+  <p:clrMapOvr>
+    <a:masterClrMapping/>
+  </p:clrMapOvr>
+  <p:timing>
+    <p:tnLst>
+      <p:par>
+        <p:cTn id="1" dur="indefinite" restart="never" nodeType="tmRoot"/>
+      </p:par>
+    </p:tnLst>
+  </p:timing>
+</p:sld>
+</file>
+
+<file path=ppt/slides/slide21.xml><?xml version="1.0" encoding="utf-8"?>
+<p:sld xmlns:a="http://schemas.openxmlformats.org/drawingml/2006/main" xmlns:r="http://schemas.openxmlformats.org/officeDocument/2006/relationships" xmlns:p="http://schemas.openxmlformats.org/presentationml/2006/main">
+  <p:cSld>
+    <p:spTree>
+      <p:nvGrpSpPr>
+        <p:cNvPr id="1" name=""/>
+        <p:cNvGrpSpPr/>
+        <p:nvPr/>
+      </p:nvGrpSpPr>
+      <p:grpSpPr>
+        <a:xfrm>
+          <a:off x="0" y="0"/>
+          <a:ext cx="0" cy="0"/>
+          <a:chOff x="0" y="0"/>
+          <a:chExt cx="0" cy="0"/>
+        </a:xfrm>
+      </p:grpSpPr>
+      <p:sp>
+        <p:nvSpPr>
+          <p:cNvPr id="2" name="Title 1"/>
+          <p:cNvSpPr>
+            <a:spLocks noGrp="1"/>
+          </p:cNvSpPr>
+          <p:nvPr>
+            <p:ph type="title"/>
+          </p:nvPr>
+        </p:nvSpPr>
+        <p:spPr/>
+        <p:txBody>
+          <a:bodyPr/>
+          <a:lstStyle/>
+          <a:p>
+            <a:endParaRPr lang="en-US"/>
+          </a:p>
+        </p:txBody>
+      </p:sp>
+      <mc:AlternateContent xmlns:mc="http://schemas.openxmlformats.org/markup-compatibility/2006" xmlns:a14="http://schemas.microsoft.com/office/drawing/2010/main">
+        <mc:Choice Requires="a14">
+          <p:sp>
+            <p:nvSpPr>
+              <p:cNvPr id="3" name="Content Placeholder 2"/>
+              <p:cNvSpPr>
+                <a:spLocks noGrp="1"/>
+              </p:cNvSpPr>
+              <p:nvPr>
+                <p:ph idx="1"/>
+              </p:nvPr>
+            </p:nvSpPr>
+            <p:spPr/>
+            <p:txBody>
+              <a:bodyPr>
+                <a:normAutofit/>
+              </a:bodyPr>
+              <a:lstStyle/>
+              <a:p>
+                <a:pPr marL="0" indent="0">
+                  <a:buNone/>
+                </a:pPr>
+                <a:r>
                   <a:rPr lang="en-US" sz="3600" b="1" dirty="0" smtClean="0"/>
                   <a:t>Shrinkage</a:t>
                 </a:r>
@@ -13309,7 +14589,7 @@
 </p:sld>
 </file>
 
-<file path=ppt/slides/slide21.xml><?xml version="1.0" encoding="utf-8"?>
+<file path=ppt/slides/slide22.xml><?xml version="1.0" encoding="utf-8"?>
 <p:sld xmlns:a="http://schemas.openxmlformats.org/drawingml/2006/main" xmlns:r="http://schemas.openxmlformats.org/officeDocument/2006/relationships" xmlns:p="http://schemas.openxmlformats.org/presentationml/2006/main">
   <p:cSld>
     <p:spTree>
@@ -14275,7 +15555,7 @@
 </p:sld>
 </file>
 
-<file path=ppt/slides/slide22.xml><?xml version="1.0" encoding="utf-8"?>
+<file path=ppt/slides/slide23.xml><?xml version="1.0" encoding="utf-8"?>
 <p:sld xmlns:a="http://schemas.openxmlformats.org/drawingml/2006/main" xmlns:r="http://schemas.openxmlformats.org/officeDocument/2006/relationships" xmlns:p="http://schemas.openxmlformats.org/presentationml/2006/main">
   <p:cSld>
     <p:spTree>
@@ -14374,7 +15654,7 @@
 </p:sld>
 </file>
 
-<file path=ppt/slides/slide23.xml><?xml version="1.0" encoding="utf-8"?>
+<file path=ppt/slides/slide24.xml><?xml version="1.0" encoding="utf-8"?>
 <p:sld xmlns:a="http://schemas.openxmlformats.org/drawingml/2006/main" xmlns:r="http://schemas.openxmlformats.org/officeDocument/2006/relationships" xmlns:p="http://schemas.openxmlformats.org/presentationml/2006/main">
   <p:cSld>
     <p:spTree>
@@ -15683,7 +16963,7 @@
 </p:sld>
 </file>
 
-<file path=ppt/slides/slide24.xml><?xml version="1.0" encoding="utf-8"?>
+<file path=ppt/slides/slide25.xml><?xml version="1.0" encoding="utf-8"?>
 <p:sld xmlns:a="http://schemas.openxmlformats.org/drawingml/2006/main" xmlns:r="http://schemas.openxmlformats.org/officeDocument/2006/relationships" xmlns:p="http://schemas.openxmlformats.org/presentationml/2006/main">
   <p:cSld>
     <p:spTree>

</xml_diff>